<commit_message>
Update agenda and modernize pres design
</commit_message>
<xml_diff>
--- a/WIoT_WS_Section0_Introduction.pptx
+++ b/WIoT_WS_Section0_Introduction.pptx
@@ -3,18 +3,19 @@
 <p:presentation xmlns:a="http://schemas.openxmlformats.org/drawingml/2006/main" xmlns:r="http://schemas.openxmlformats.org/officeDocument/2006/relationships" xmlns:p="http://schemas.openxmlformats.org/presentationml/2006/main" saveSubsetFonts="1">
   <p:sldMasterIdLst>
     <p:sldMasterId id="2147483755" r:id="rId1"/>
+    <p:sldMasterId id="2147483762" r:id="rId2"/>
   </p:sldMasterIdLst>
   <p:notesMasterIdLst>
-    <p:notesMasterId r:id="rId6"/>
+    <p:notesMasterId r:id="rId7"/>
   </p:notesMasterIdLst>
   <p:handoutMasterIdLst>
-    <p:handoutMasterId r:id="rId7"/>
+    <p:handoutMasterId r:id="rId8"/>
   </p:handoutMasterIdLst>
   <p:sldIdLst>
-    <p:sldId id="256" r:id="rId2"/>
-    <p:sldId id="259" r:id="rId3"/>
-    <p:sldId id="272" r:id="rId4"/>
-    <p:sldId id="273" r:id="rId5"/>
+    <p:sldId id="2709" r:id="rId3"/>
+    <p:sldId id="259" r:id="rId4"/>
+    <p:sldId id="272" r:id="rId5"/>
+    <p:sldId id="273" r:id="rId6"/>
   </p:sldIdLst>
   <p:sldSz cx="9144000" cy="6858000" type="screen4x3"/>
   <p:notesSz cx="6858000" cy="9144000"/>
@@ -259,7 +260,7 @@
             <a:fld id="{7A2F5B37-18BF-F64B-9F64-794EFF2CD111}" type="datetimeFigureOut">
               <a:rPr lang="en-US"/>
               <a:pPr/>
-              <a:t>9/12/2019</a:t>
+              <a:t>12/3/2019</a:t>
             </a:fld>
             <a:endParaRPr lang="en-US"/>
           </a:p>
@@ -394,14 +395,14 @@
           <a:effectLst/>
           <a:extLst>
             <a:ext uri="{909E8E84-426E-40dd-AFC4-6F175D3DCCD1}">
-              <a14:hiddenFill xmlns="" xmlns:a14="http://schemas.microsoft.com/office/drawing/2010/main">
+              <a14:hiddenFill xmlns:a14="http://schemas.microsoft.com/office/drawing/2010/main" xmlns="">
                 <a:solidFill>
                   <a:schemeClr val="accent1"/>
                 </a:solidFill>
               </a14:hiddenFill>
             </a:ext>
             <a:ext uri="{91240B29-F687-4f45-9708-019B960494DF}">
-              <a14:hiddenLine xmlns="" xmlns:a14="http://schemas.microsoft.com/office/drawing/2010/main" w="9525">
+              <a14:hiddenLine xmlns:a14="http://schemas.microsoft.com/office/drawing/2010/main" xmlns="" w="9525">
                 <a:solidFill>
                   <a:schemeClr val="tx1"/>
                 </a:solidFill>
@@ -411,7 +412,7 @@
               </a14:hiddenLine>
             </a:ext>
             <a:ext uri="{AF507438-7753-43e0-B8FC-AC1667EBCBE1}">
-              <a14:hiddenEffects xmlns="" xmlns:a14="http://schemas.microsoft.com/office/drawing/2010/main">
+              <a14:hiddenEffects xmlns:a14="http://schemas.microsoft.com/office/drawing/2010/main" xmlns="">
                 <a:effectLst>
                   <a:outerShdw dist="35921" dir="2700000" algn="ctr" rotWithShape="0">
                     <a:schemeClr val="bg2"/>
@@ -468,14 +469,14 @@
           <a:effectLst/>
           <a:extLst>
             <a:ext uri="{909E8E84-426E-40dd-AFC4-6F175D3DCCD1}">
-              <a14:hiddenFill xmlns="" xmlns:a14="http://schemas.microsoft.com/office/drawing/2010/main">
+              <a14:hiddenFill xmlns:a14="http://schemas.microsoft.com/office/drawing/2010/main" xmlns="">
                 <a:solidFill>
                   <a:schemeClr val="accent1"/>
                 </a:solidFill>
               </a14:hiddenFill>
             </a:ext>
             <a:ext uri="{91240B29-F687-4f45-9708-019B960494DF}">
-              <a14:hiddenLine xmlns="" xmlns:a14="http://schemas.microsoft.com/office/drawing/2010/main" w="9525">
+              <a14:hiddenLine xmlns:a14="http://schemas.microsoft.com/office/drawing/2010/main" xmlns="" w="9525">
                 <a:solidFill>
                   <a:schemeClr val="tx1"/>
                 </a:solidFill>
@@ -485,7 +486,7 @@
               </a14:hiddenLine>
             </a:ext>
             <a:ext uri="{AF507438-7753-43e0-B8FC-AC1667EBCBE1}">
-              <a14:hiddenEffects xmlns="" xmlns:a14="http://schemas.microsoft.com/office/drawing/2010/main">
+              <a14:hiddenEffects xmlns:a14="http://schemas.microsoft.com/office/drawing/2010/main" xmlns="">
                 <a:effectLst>
                   <a:outerShdw dist="35921" dir="2700000" algn="ctr" rotWithShape="0">
                     <a:schemeClr val="bg2"/>
@@ -547,14 +548,14 @@
           <a:effectLst/>
           <a:extLst>
             <a:ext uri="{909E8E84-426E-40dd-AFC4-6F175D3DCCD1}">
-              <a14:hiddenFill xmlns="" xmlns:a14="http://schemas.microsoft.com/office/drawing/2010/main">
+              <a14:hiddenFill xmlns:a14="http://schemas.microsoft.com/office/drawing/2010/main" xmlns="">
                 <a:solidFill>
                   <a:srgbClr val="FFFFFF"/>
                 </a:solidFill>
               </a14:hiddenFill>
             </a:ext>
             <a:ext uri="{AF507438-7753-43e0-B8FC-AC1667EBCBE1}">
-              <a14:hiddenEffects xmlns="" xmlns:a14="http://schemas.microsoft.com/office/drawing/2010/main">
+              <a14:hiddenEffects xmlns:a14="http://schemas.microsoft.com/office/drawing/2010/main" xmlns="">
                 <a:effectLst>
                   <a:outerShdw blurRad="63500" dist="38099" dir="2700000" algn="ctr" rotWithShape="0">
                     <a:srgbClr val="000000">
@@ -565,10 +566,10 @@
               </a14:hiddenEffects>
             </a:ext>
             <a:ext uri="{53640926-AAD7-44d8-BBD7-CCE9431645EC}">
-              <a14:shadowObscured xmlns="" xmlns:a14="http://schemas.microsoft.com/office/drawing/2010/main" val="1"/>
+              <a14:shadowObscured xmlns:a14="http://schemas.microsoft.com/office/drawing/2010/main" xmlns="" val="1"/>
             </a:ext>
             <a:ext uri="{FAA26D3D-D897-4be2-8F04-BA451C77F1D7}">
-              <ma14:placeholderFlag xmlns="" xmlns:ma14="http://schemas.microsoft.com/office/mac/drawingml/2011/main" val="1"/>
+              <ma14:placeholderFlag xmlns:ma14="http://schemas.microsoft.com/office/mac/drawingml/2011/main" xmlns="" val="1"/>
             </a:ext>
           </a:extLst>
         </p:spPr>
@@ -598,14 +599,14 @@
           <a:effectLst/>
           <a:extLst>
             <a:ext uri="{909E8E84-426E-40dd-AFC4-6F175D3DCCD1}">
-              <a14:hiddenFill xmlns="" xmlns:a14="http://schemas.microsoft.com/office/drawing/2010/main">
+              <a14:hiddenFill xmlns:a14="http://schemas.microsoft.com/office/drawing/2010/main" xmlns="">
                 <a:solidFill>
                   <a:schemeClr val="accent1"/>
                 </a:solidFill>
               </a14:hiddenFill>
             </a:ext>
             <a:ext uri="{91240B29-F687-4f45-9708-019B960494DF}">
-              <a14:hiddenLine xmlns="" xmlns:a14="http://schemas.microsoft.com/office/drawing/2010/main" w="9525">
+              <a14:hiddenLine xmlns:a14="http://schemas.microsoft.com/office/drawing/2010/main" xmlns="" w="9525">
                 <a:solidFill>
                   <a:schemeClr val="tx1"/>
                 </a:solidFill>
@@ -615,7 +616,7 @@
               </a14:hiddenLine>
             </a:ext>
             <a:ext uri="{AF507438-7753-43e0-B8FC-AC1667EBCBE1}">
-              <a14:hiddenEffects xmlns="" xmlns:a14="http://schemas.microsoft.com/office/drawing/2010/main">
+              <a14:hiddenEffects xmlns:a14="http://schemas.microsoft.com/office/drawing/2010/main" xmlns="">
                 <a:effectLst>
                   <a:outerShdw dist="35921" dir="2700000" algn="ctr" rotWithShape="0">
                     <a:schemeClr val="bg2"/>
@@ -694,14 +695,14 @@
           <a:effectLst/>
           <a:extLst>
             <a:ext uri="{909E8E84-426E-40dd-AFC4-6F175D3DCCD1}">
-              <a14:hiddenFill xmlns="" xmlns:a14="http://schemas.microsoft.com/office/drawing/2010/main">
+              <a14:hiddenFill xmlns:a14="http://schemas.microsoft.com/office/drawing/2010/main" xmlns="">
                 <a:solidFill>
                   <a:schemeClr val="accent1"/>
                 </a:solidFill>
               </a14:hiddenFill>
             </a:ext>
             <a:ext uri="{91240B29-F687-4f45-9708-019B960494DF}">
-              <a14:hiddenLine xmlns="" xmlns:a14="http://schemas.microsoft.com/office/drawing/2010/main" w="9525">
+              <a14:hiddenLine xmlns:a14="http://schemas.microsoft.com/office/drawing/2010/main" xmlns="" w="9525">
                 <a:solidFill>
                   <a:schemeClr val="tx1"/>
                 </a:solidFill>
@@ -711,7 +712,7 @@
               </a14:hiddenLine>
             </a:ext>
             <a:ext uri="{AF507438-7753-43e0-B8FC-AC1667EBCBE1}">
-              <a14:hiddenEffects xmlns="" xmlns:a14="http://schemas.microsoft.com/office/drawing/2010/main">
+              <a14:hiddenEffects xmlns:a14="http://schemas.microsoft.com/office/drawing/2010/main" xmlns="">
                 <a:effectLst>
                   <a:outerShdw dist="35921" dir="2700000" algn="ctr" rotWithShape="0">
                     <a:schemeClr val="bg2"/>
@@ -768,14 +769,14 @@
           <a:effectLst/>
           <a:extLst>
             <a:ext uri="{909E8E84-426E-40dd-AFC4-6F175D3DCCD1}">
-              <a14:hiddenFill xmlns="" xmlns:a14="http://schemas.microsoft.com/office/drawing/2010/main">
+              <a14:hiddenFill xmlns:a14="http://schemas.microsoft.com/office/drawing/2010/main" xmlns="">
                 <a:solidFill>
                   <a:schemeClr val="accent1"/>
                 </a:solidFill>
               </a14:hiddenFill>
             </a:ext>
             <a:ext uri="{91240B29-F687-4f45-9708-019B960494DF}">
-              <a14:hiddenLine xmlns="" xmlns:a14="http://schemas.microsoft.com/office/drawing/2010/main" w="9525">
+              <a14:hiddenLine xmlns:a14="http://schemas.microsoft.com/office/drawing/2010/main" xmlns="" w="9525">
                 <a:solidFill>
                   <a:schemeClr val="tx1"/>
                 </a:solidFill>
@@ -785,7 +786,7 @@
               </a14:hiddenLine>
             </a:ext>
             <a:ext uri="{AF507438-7753-43e0-B8FC-AC1667EBCBE1}">
-              <a14:hiddenEffects xmlns="" xmlns:a14="http://schemas.microsoft.com/office/drawing/2010/main">
+              <a14:hiddenEffects xmlns:a14="http://schemas.microsoft.com/office/drawing/2010/main" xmlns="">
                 <a:effectLst>
                   <a:outerShdw dist="35921" dir="2700000" algn="ctr" rotWithShape="0">
                     <a:schemeClr val="bg2"/>
@@ -950,9 +951,9 @@
 </p:notesMaster>
 </file>
 
-<file path=ppt/slideLayouts/slideLayout1.xml><?xml version="1.0" encoding="utf-8"?>
-<p:sldLayout xmlns:a="http://schemas.openxmlformats.org/drawingml/2006/main" xmlns:r="http://schemas.openxmlformats.org/officeDocument/2006/relationships" xmlns:p="http://schemas.openxmlformats.org/presentationml/2006/main" showMasterSp="0" preserve="1" userDrawn="1">
-  <p:cSld name="Title Slide">
+<file path=ppt/notesSlides/notesSlide1.xml><?xml version="1.0" encoding="utf-8"?>
+<p:notes xmlns:a="http://schemas.openxmlformats.org/drawingml/2006/main" xmlns:r="http://schemas.openxmlformats.org/officeDocument/2006/relationships" xmlns:p="http://schemas.openxmlformats.org/presentationml/2006/main">
+  <p:cSld>
     <p:spTree>
       <p:nvGrpSpPr>
         <p:cNvPr id="1" name=""/>
@@ -967,675 +968,135 @@
           <a:chExt cx="0" cy="0"/>
         </a:xfrm>
       </p:grpSpPr>
-      <p:pic>
-        <p:nvPicPr>
-          <p:cNvPr id="14" name="Picture 3"/>
-          <p:cNvPicPr>
-            <a:picLocks noChangeAspect="1" noChangeArrowheads="1"/>
-          </p:cNvPicPr>
-          <p:nvPr userDrawn="1"/>
-        </p:nvPicPr>
-        <p:blipFill>
-          <a:blip r:embed="rId2">
-            <a:extLst>
-              <a:ext uri="{28A0092B-C50C-407E-A947-70E740481C1C}">
-                <a14:useLocalDpi xmlns:a14="http://schemas.microsoft.com/office/drawing/2010/main" val="0"/>
-              </a:ext>
-            </a:extLst>
-          </a:blip>
-          <a:stretch>
-            <a:fillRect/>
-          </a:stretch>
-        </p:blipFill>
-        <p:spPr bwMode="auto">
-          <a:xfrm>
-            <a:off x="0" y="6477000"/>
-            <a:ext cx="9144000" cy="380999"/>
-          </a:xfrm>
-          <a:prstGeom prst="rect">
-            <a:avLst/>
-          </a:prstGeom>
-          <a:noFill/>
-          <a:ln>
-            <a:noFill/>
-          </a:ln>
-          <a:extLst>
-            <a:ext uri="{909E8E84-426E-40dd-AFC4-6F175D3DCCD1}">
-              <a14:hiddenFill xmlns:a14="http://schemas.microsoft.com/office/drawing/2010/main" xmlns="">
-                <a:solidFill>
-                  <a:srgbClr val="FFFFFF"/>
-                </a:solidFill>
-              </a14:hiddenFill>
-            </a:ext>
-            <a:ext uri="{91240B29-F687-4f45-9708-019B960494DF}">
-              <a14:hiddenLine xmlns:a14="http://schemas.microsoft.com/office/drawing/2010/main" xmlns="" w="9525">
-                <a:solidFill>
-                  <a:srgbClr val="000000"/>
-                </a:solidFill>
-                <a:miter lim="800000"/>
-                <a:headEnd/>
-                <a:tailEnd/>
-              </a14:hiddenLine>
-            </a:ext>
-          </a:extLst>
-        </p:spPr>
-      </p:pic>
       <p:sp>
         <p:nvSpPr>
-          <p:cNvPr id="2" name="Title 1"/>
+          <p:cNvPr id="2" name="Slide Image Placeholder 1"/>
+          <p:cNvSpPr>
+            <a:spLocks noGrp="1" noRot="1" noChangeAspect="1"/>
+          </p:cNvSpPr>
+          <p:nvPr>
+            <p:ph type="sldImg"/>
+          </p:nvPr>
+        </p:nvSpPr>
+        <p:spPr/>
+      </p:sp>
+      <p:sp>
+        <p:nvSpPr>
+          <p:cNvPr id="3" name="Notes Placeholder 2"/>
           <p:cNvSpPr>
             <a:spLocks noGrp="1"/>
           </p:cNvSpPr>
           <p:nvPr>
-            <p:ph type="ctrTitle"/>
+            <p:ph type="body" idx="1"/>
           </p:nvPr>
         </p:nvSpPr>
-        <p:spPr>
-          <a:xfrm>
-            <a:off x="426243" y="1521465"/>
-            <a:ext cx="4823748" cy="1512295"/>
-          </a:xfrm>
-        </p:spPr>
+        <p:spPr/>
         <p:txBody>
-          <a:bodyPr anchor="b" anchorCtr="0">
-            <a:normAutofit/>
-          </a:bodyPr>
-          <a:lstStyle>
-            <a:lvl1pPr>
-              <a:lnSpc>
-                <a:spcPct val="95000"/>
-              </a:lnSpc>
-              <a:defRPr sz="3400"/>
-            </a:lvl1pPr>
-          </a:lstStyle>
-          <a:p>
-            <a:r>
-              <a:rPr lang="en-US"/>
-              <a:t>Click to edit Master title style</a:t>
-            </a:r>
+          <a:bodyPr/>
+          <a:lstStyle/>
+          <a:p>
             <a:endParaRPr lang="en-US" dirty="0"/>
           </a:p>
         </p:txBody>
       </p:sp>
       <p:sp>
         <p:nvSpPr>
-          <p:cNvPr id="3" name="Subtitle 2"/>
+          <p:cNvPr id="4" name="Slide Number Placeholder 3"/>
           <p:cNvSpPr>
             <a:spLocks noGrp="1"/>
           </p:cNvSpPr>
           <p:nvPr>
-            <p:ph type="subTitle" idx="1"/>
+            <p:ph type="sldNum" sz="quarter" idx="10"/>
           </p:nvPr>
         </p:nvSpPr>
-        <p:spPr>
-          <a:xfrm>
-            <a:off x="426242" y="3031618"/>
-            <a:ext cx="4448490" cy="1246936"/>
-          </a:xfrm>
-          <a:prstGeom prst="rect">
-            <a:avLst/>
-          </a:prstGeom>
-        </p:spPr>
+        <p:spPr/>
         <p:txBody>
-          <a:bodyPr>
-            <a:normAutofit/>
-          </a:bodyPr>
-          <a:lstStyle>
-            <a:lvl1pPr marL="0" indent="0" algn="l">
+          <a:bodyPr/>
+          <a:lstStyle/>
+          <a:p>
+            <a:pPr marL="0" marR="0" lvl="0" indent="0" algn="r" defTabSz="685800" rtl="0" eaLnBrk="1" fontAlgn="auto" latinLnBrk="0" hangingPunct="1">
               <a:lnSpc>
-                <a:spcPct val="95000"/>
+                <a:spcPct val="100000"/>
               </a:lnSpc>
-              <a:buNone/>
-              <a:defRPr sz="2000" i="0">
-                <a:solidFill>
-                  <a:schemeClr val="tx1">
-                    <a:tint val="75000"/>
-                  </a:schemeClr>
-                </a:solidFill>
-              </a:defRPr>
-            </a:lvl1pPr>
-            <a:lvl2pPr marL="457200" indent="0" algn="ctr">
-              <a:buNone/>
-              <a:defRPr>
-                <a:solidFill>
-                  <a:schemeClr val="tx1">
-                    <a:tint val="75000"/>
-                  </a:schemeClr>
-                </a:solidFill>
-              </a:defRPr>
-            </a:lvl2pPr>
-            <a:lvl3pPr marL="914400" indent="0" algn="ctr">
-              <a:buNone/>
-              <a:defRPr>
-                <a:solidFill>
-                  <a:schemeClr val="tx1">
-                    <a:tint val="75000"/>
-                  </a:schemeClr>
-                </a:solidFill>
-              </a:defRPr>
-            </a:lvl3pPr>
-            <a:lvl4pPr marL="1371600" indent="0" algn="ctr">
-              <a:buNone/>
-              <a:defRPr>
-                <a:solidFill>
-                  <a:schemeClr val="tx1">
-                    <a:tint val="75000"/>
-                  </a:schemeClr>
-                </a:solidFill>
-              </a:defRPr>
-            </a:lvl4pPr>
-            <a:lvl5pPr marL="1828800" indent="0" algn="ctr">
-              <a:buNone/>
-              <a:defRPr>
-                <a:solidFill>
-                  <a:schemeClr val="tx1">
-                    <a:tint val="75000"/>
-                  </a:schemeClr>
-                </a:solidFill>
-              </a:defRPr>
-            </a:lvl5pPr>
-            <a:lvl6pPr marL="2286000" indent="0" algn="ctr">
-              <a:buNone/>
-              <a:defRPr>
-                <a:solidFill>
-                  <a:schemeClr val="tx1">
-                    <a:tint val="75000"/>
-                  </a:schemeClr>
-                </a:solidFill>
-              </a:defRPr>
-            </a:lvl6pPr>
-            <a:lvl7pPr marL="2743200" indent="0" algn="ctr">
-              <a:buNone/>
-              <a:defRPr>
-                <a:solidFill>
-                  <a:schemeClr val="tx1">
-                    <a:tint val="75000"/>
-                  </a:schemeClr>
-                </a:solidFill>
-              </a:defRPr>
-            </a:lvl7pPr>
-            <a:lvl8pPr marL="3200400" indent="0" algn="ctr">
-              <a:buNone/>
-              <a:defRPr>
-                <a:solidFill>
-                  <a:schemeClr val="tx1">
-                    <a:tint val="75000"/>
-                  </a:schemeClr>
-                </a:solidFill>
-              </a:defRPr>
-            </a:lvl8pPr>
-            <a:lvl9pPr marL="3657600" indent="0" algn="ctr">
-              <a:buNone/>
-              <a:defRPr>
-                <a:solidFill>
-                  <a:schemeClr val="tx1">
-                    <a:tint val="75000"/>
-                  </a:schemeClr>
-                </a:solidFill>
-              </a:defRPr>
-            </a:lvl9pPr>
-          </a:lstStyle>
-          <a:p>
-            <a:r>
-              <a:rPr lang="en-US"/>
-              <a:t>Click to edit Master subtitle style</a:t>
-            </a:r>
-            <a:endParaRPr lang="en-US" dirty="0"/>
-          </a:p>
-        </p:txBody>
-      </p:sp>
-      <p:sp>
-        <p:nvSpPr>
-          <p:cNvPr id="13" name="Rectangle 12"/>
-          <p:cNvSpPr/>
-          <p:nvPr/>
-        </p:nvSpPr>
-        <p:spPr>
-          <a:xfrm>
-            <a:off x="7599977" y="6552083"/>
-            <a:ext cx="1430200" cy="230832"/>
-          </a:xfrm>
-          <a:prstGeom prst="rect">
-            <a:avLst/>
-          </a:prstGeom>
-        </p:spPr>
-        <p:txBody>
-          <a:bodyPr wrap="none">
-            <a:spAutoFit/>
-          </a:bodyPr>
-          <a:lstStyle/>
-          <a:p>
-            <a:pPr algn="ctr"/>
-            <a:r>
-              <a:rPr lang="en-US" sz="900" dirty="0">
-                <a:solidFill>
-                  <a:schemeClr val="bg1">
-                    <a:lumMod val="50000"/>
-                  </a:schemeClr>
-                </a:solidFill>
-              </a:rPr>
-              <a:t>© 2017 IBM Corporation</a:t>
-            </a:r>
-          </a:p>
-        </p:txBody>
-      </p:sp>
-      <p:pic>
-        <p:nvPicPr>
-          <p:cNvPr id="6" name="Picture 5"/>
-          <p:cNvPicPr>
-            <a:picLocks noChangeAspect="1"/>
-          </p:cNvPicPr>
-          <p:nvPr userDrawn="1"/>
-        </p:nvPicPr>
-        <p:blipFill>
-          <a:blip r:embed="rId3">
-            <a:duotone>
-              <a:schemeClr val="bg2">
-                <a:shade val="45000"/>
-                <a:satMod val="135000"/>
-              </a:schemeClr>
-              <a:prstClr val="white"/>
-            </a:duotone>
-          </a:blip>
-          <a:stretch>
-            <a:fillRect/>
-          </a:stretch>
-        </p:blipFill>
-        <p:spPr>
-          <a:xfrm>
-            <a:off x="266222" y="959216"/>
-            <a:ext cx="8763955" cy="4244503"/>
-          </a:xfrm>
-          <a:prstGeom prst="rect">
-            <a:avLst/>
-          </a:prstGeom>
-        </p:spPr>
-      </p:pic>
-      <p:pic>
-        <p:nvPicPr>
-          <p:cNvPr id="7" name="Picture 14" descr="individual assets-01.png"/>
-          <p:cNvPicPr>
-            <a:picLocks noChangeAspect="1"/>
-          </p:cNvPicPr>
-          <p:nvPr userDrawn="1"/>
-        </p:nvPicPr>
-        <p:blipFill>
-          <a:blip r:embed="rId4" cstate="print"/>
-          <a:srcRect/>
-          <a:stretch>
-            <a:fillRect/>
-          </a:stretch>
-        </p:blipFill>
-        <p:spPr bwMode="auto">
-          <a:xfrm>
-            <a:off x="274689" y="931497"/>
-            <a:ext cx="231775" cy="852487"/>
-          </a:xfrm>
-          <a:prstGeom prst="rect">
-            <a:avLst/>
-          </a:prstGeom>
-          <a:noFill/>
-          <a:ln w="9525">
-            <a:noFill/>
-            <a:miter lim="800000"/>
-            <a:headEnd/>
-            <a:tailEnd/>
-          </a:ln>
-        </p:spPr>
-      </p:pic>
-      <p:pic>
-        <p:nvPicPr>
-          <p:cNvPr id="9" name="Picture 8"/>
-          <p:cNvPicPr>
-            <a:picLocks noChangeAspect="1"/>
-          </p:cNvPicPr>
-          <p:nvPr userDrawn="1"/>
-        </p:nvPicPr>
-        <p:blipFill>
-          <a:blip r:embed="rId5">
-            <a:extLst>
-              <a:ext uri="{28A0092B-C50C-407E-A947-70E740481C1C}">
-                <a14:useLocalDpi xmlns:a14="http://schemas.microsoft.com/office/drawing/2010/main" val="0"/>
-              </a:ext>
-            </a:extLst>
-          </a:blip>
-          <a:stretch>
-            <a:fillRect/>
-          </a:stretch>
-        </p:blipFill>
-        <p:spPr>
-          <a:xfrm>
-            <a:off x="0" y="12637"/>
-            <a:ext cx="9144793" cy="714438"/>
-          </a:xfrm>
-          <a:prstGeom prst="rect">
-            <a:avLst/>
-          </a:prstGeom>
-        </p:spPr>
-      </p:pic>
-      <p:sp>
-        <p:nvSpPr>
-          <p:cNvPr id="11" name="TextBox 10"/>
-          <p:cNvSpPr txBox="1">
-            <a:spLocks noChangeArrowheads="1"/>
-          </p:cNvSpPr>
-          <p:nvPr userDrawn="1"/>
-        </p:nvSpPr>
-        <p:spPr bwMode="auto">
-          <a:xfrm>
-            <a:off x="194733" y="131397"/>
-            <a:ext cx="7405244" cy="338554"/>
-          </a:xfrm>
-          <a:prstGeom prst="rect">
-            <a:avLst/>
-          </a:prstGeom>
-          <a:noFill/>
-          <a:ln>
-            <a:noFill/>
-          </a:ln>
-          <a:extLst>
-            <a:ext uri="{909E8E84-426E-40dd-AFC4-6F175D3DCCD1}">
-              <a14:hiddenFill xmlns:a14="http://schemas.microsoft.com/office/drawing/2010/main" xmlns="">
-                <a:solidFill>
-                  <a:srgbClr val="FFFFFF"/>
-                </a:solidFill>
-              </a14:hiddenFill>
-            </a:ext>
-            <a:ext uri="{91240B29-F687-4f45-9708-019B960494DF}">
-              <a14:hiddenLine xmlns:a14="http://schemas.microsoft.com/office/drawing/2010/main" xmlns="" w="9525">
-                <a:solidFill>
-                  <a:srgbClr val="000000"/>
-                </a:solidFill>
-                <a:miter lim="800000"/>
-                <a:headEnd/>
-                <a:tailEnd/>
-              </a14:hiddenLine>
-            </a:ext>
-          </a:extLst>
-        </p:spPr>
-        <p:txBody>
-          <a:bodyPr wrap="square">
-            <a:spAutoFit/>
-          </a:bodyPr>
-          <a:lstStyle>
-            <a:lvl1pPr eaLnBrk="0" hangingPunct="0">
-              <a:defRPr sz="1600">
-                <a:solidFill>
-                  <a:schemeClr val="tx1"/>
-                </a:solidFill>
-                <a:latin typeface="Arial" charset="0"/>
-                <a:cs typeface="Arial" charset="0"/>
-              </a:defRPr>
-            </a:lvl1pPr>
-            <a:lvl2pPr marL="742950" indent="-285750" eaLnBrk="0" hangingPunct="0">
-              <a:defRPr sz="1600">
-                <a:solidFill>
-                  <a:schemeClr val="tx1"/>
-                </a:solidFill>
-                <a:latin typeface="Arial" charset="0"/>
-                <a:cs typeface="Arial" charset="0"/>
-              </a:defRPr>
-            </a:lvl2pPr>
-            <a:lvl3pPr marL="1143000" indent="-228600" eaLnBrk="0" hangingPunct="0">
-              <a:defRPr sz="1600">
-                <a:solidFill>
-                  <a:schemeClr val="tx1"/>
-                </a:solidFill>
-                <a:latin typeface="Arial" charset="0"/>
-                <a:cs typeface="Arial" charset="0"/>
-              </a:defRPr>
-            </a:lvl3pPr>
-            <a:lvl4pPr marL="1600200" indent="-228600" eaLnBrk="0" hangingPunct="0">
-              <a:defRPr sz="1600">
-                <a:solidFill>
-                  <a:schemeClr val="tx1"/>
-                </a:solidFill>
-                <a:latin typeface="Arial" charset="0"/>
-                <a:cs typeface="Arial" charset="0"/>
-              </a:defRPr>
-            </a:lvl4pPr>
-            <a:lvl5pPr marL="2057400" indent="-228600" eaLnBrk="0" hangingPunct="0">
-              <a:defRPr sz="1600">
-                <a:solidFill>
-                  <a:schemeClr val="tx1"/>
-                </a:solidFill>
-                <a:latin typeface="Arial" charset="0"/>
-                <a:cs typeface="Arial" charset="0"/>
-              </a:defRPr>
-            </a:lvl5pPr>
-            <a:lvl6pPr marL="2514600" indent="-228600" eaLnBrk="0" fontAlgn="base" hangingPunct="0">
               <a:spcBef>
-                <a:spcPct val="0"/>
+                <a:spcPts val="0"/>
               </a:spcBef>
               <a:spcAft>
-                <a:spcPct val="0"/>
+                <a:spcPts val="0"/>
               </a:spcAft>
-              <a:defRPr sz="1600">
-                <a:solidFill>
-                  <a:schemeClr val="tx1"/>
-                </a:solidFill>
-                <a:latin typeface="Arial" charset="0"/>
-                <a:cs typeface="Arial" charset="0"/>
-              </a:defRPr>
-            </a:lvl6pPr>
-            <a:lvl7pPr marL="2971800" indent="-228600" eaLnBrk="0" fontAlgn="base" hangingPunct="0">
-              <a:spcBef>
-                <a:spcPct val="0"/>
-              </a:spcBef>
-              <a:spcAft>
-                <a:spcPct val="0"/>
-              </a:spcAft>
-              <a:defRPr sz="1600">
-                <a:solidFill>
-                  <a:schemeClr val="tx1"/>
-                </a:solidFill>
-                <a:latin typeface="Arial" charset="0"/>
-                <a:cs typeface="Arial" charset="0"/>
-              </a:defRPr>
-            </a:lvl7pPr>
-            <a:lvl8pPr marL="3429000" indent="-228600" eaLnBrk="0" fontAlgn="base" hangingPunct="0">
-              <a:spcBef>
-                <a:spcPct val="0"/>
-              </a:spcBef>
-              <a:spcAft>
-                <a:spcPct val="0"/>
-              </a:spcAft>
-              <a:defRPr sz="1600">
-                <a:solidFill>
-                  <a:schemeClr val="tx1"/>
-                </a:solidFill>
-                <a:latin typeface="Arial" charset="0"/>
-                <a:cs typeface="Arial" charset="0"/>
-              </a:defRPr>
-            </a:lvl8pPr>
-            <a:lvl9pPr marL="3886200" indent="-228600" eaLnBrk="0" fontAlgn="base" hangingPunct="0">
-              <a:spcBef>
-                <a:spcPct val="0"/>
-              </a:spcBef>
-              <a:spcAft>
-                <a:spcPct val="0"/>
-              </a:spcAft>
-              <a:defRPr sz="1600">
-                <a:solidFill>
-                  <a:schemeClr val="tx1"/>
-                </a:solidFill>
-                <a:latin typeface="Arial" charset="0"/>
-                <a:cs typeface="Arial" charset="0"/>
-              </a:defRPr>
-            </a:lvl9pPr>
-          </a:lstStyle>
-          <a:p>
-            <a:pPr eaLnBrk="1" hangingPunct="1">
+              <a:buClrTx/>
+              <a:buSzTx/>
+              <a:buFontTx/>
+              <a:buNone/>
+              <a:tabLst/>
               <a:defRPr/>
             </a:pPr>
-            <a:r>
-              <a:rPr lang="fr-FR" b="1" dirty="0" err="1"/>
-              <a:t>Ecosystem</a:t>
-            </a:r>
-            <a:r>
-              <a:rPr lang="fr-FR" b="1" dirty="0"/>
-              <a:t> </a:t>
-            </a:r>
-            <a:r>
-              <a:rPr lang="fr-FR" b="1" dirty="0" err="1"/>
-              <a:t>Advocacy</a:t>
-            </a:r>
-            <a:r>
-              <a:rPr lang="fr-FR" b="1" dirty="0"/>
-              <a:t> Group – </a:t>
-            </a:r>
-            <a:r>
-              <a:rPr lang="fr-FR" b="1" dirty="0" err="1"/>
-              <a:t>Technical</a:t>
-            </a:r>
-            <a:r>
-              <a:rPr lang="fr-FR" b="1" dirty="0"/>
-              <a:t> </a:t>
-            </a:r>
-            <a:r>
-              <a:rPr lang="fr-FR" b="1" dirty="0" err="1"/>
-              <a:t>Enablement</a:t>
-            </a:r>
-            <a:endParaRPr lang="en-US" b="1" dirty="0"/>
-          </a:p>
-        </p:txBody>
-      </p:sp>
-      <p:pic>
-        <p:nvPicPr>
-          <p:cNvPr id="12" name="Picture 7" descr="C:\Documents and Settings\Administrator\Desktop\Picture1.png"/>
-          <p:cNvPicPr>
-            <a:picLocks noChangeAspect="1" noChangeArrowheads="1"/>
-          </p:cNvPicPr>
-          <p:nvPr userDrawn="1"/>
-        </p:nvPicPr>
-        <p:blipFill>
-          <a:blip r:embed="rId6" cstate="email">
-            <a:extLst>
-              <a:ext uri="{28A0092B-C50C-407E-A947-70E740481C1C}">
-                <a14:useLocalDpi xmlns:a14="http://schemas.microsoft.com/office/drawing/2010/main" val="0"/>
-              </a:ext>
-            </a:extLst>
-          </a:blip>
-          <a:srcRect/>
-          <a:stretch>
-            <a:fillRect/>
-          </a:stretch>
-        </p:blipFill>
-        <p:spPr bwMode="auto">
-          <a:xfrm>
-            <a:off x="7827962" y="-68996"/>
-            <a:ext cx="1316038" cy="669925"/>
-          </a:xfrm>
-          <a:prstGeom prst="rect">
-            <a:avLst/>
-          </a:prstGeom>
-          <a:noFill/>
-          <a:ln>
-            <a:noFill/>
-          </a:ln>
-          <a:extLst>
-            <a:ext uri="{909E8E84-426E-40dd-AFC4-6F175D3DCCD1}">
-              <a14:hiddenFill xmlns:a14="http://schemas.microsoft.com/office/drawing/2010/main" xmlns="">
-                <a:solidFill>
-                  <a:srgbClr val="FFFFFF"/>
-                </a:solidFill>
-              </a14:hiddenFill>
-            </a:ext>
-            <a:ext uri="{91240B29-F687-4f45-9708-019B960494DF}">
-              <a14:hiddenLine xmlns:a14="http://schemas.microsoft.com/office/drawing/2010/main" xmlns="" w="9525">
-                <a:solidFill>
-                  <a:srgbClr val="000000"/>
-                </a:solidFill>
-                <a:miter lim="800000"/>
-                <a:headEnd/>
-                <a:tailEnd/>
-              </a14:hiddenLine>
-            </a:ext>
-          </a:extLst>
-        </p:spPr>
-      </p:pic>
-      <p:sp>
-        <p:nvSpPr>
-          <p:cNvPr id="5" name="Text Placeholder 4"/>
-          <p:cNvSpPr>
-            <a:spLocks noGrp="1"/>
-          </p:cNvSpPr>
-          <p:nvPr>
-            <p:ph type="body" sz="quarter" idx="10"/>
-          </p:nvPr>
-        </p:nvSpPr>
-        <p:spPr>
-          <a:xfrm>
-            <a:off x="266221" y="959217"/>
-            <a:ext cx="8763956" cy="4244502"/>
-          </a:xfrm>
-          <a:prstGeom prst="rect">
-            <a:avLst/>
-          </a:prstGeom>
-          <a:ln>
-            <a:solidFill>
-              <a:schemeClr val="bg2">
-                <a:lumMod val="50000"/>
-              </a:schemeClr>
-            </a:solidFill>
-          </a:ln>
-        </p:spPr>
-        <p:txBody>
-          <a:bodyPr anchor="ctr" anchorCtr="1"/>
-          <a:lstStyle>
-            <a:lvl1pPr marL="0" indent="0" algn="ctr">
-              <a:buFontTx/>
-              <a:buNone/>
-              <a:defRPr lang="en-US" sz="5400" b="1" dirty="0" smtClean="0">
+            <a:fld id="{20AED143-1506-434C-B47D-CBF33F177BEB}" type="slidenum">
+              <a:rPr kumimoji="0" lang="en-US" sz="1200" b="0" i="0" u="none" strike="noStrike" kern="1200" cap="none" spc="0" normalizeH="0" baseline="0" noProof="0" smtClean="0">
                 <a:ln>
-                  <a:solidFill>
-                    <a:schemeClr val="tx2">
-                      <a:lumMod val="50000"/>
-                    </a:schemeClr>
-                  </a:solidFill>
+                  <a:noFill/>
                 </a:ln>
                 <a:solidFill>
-                  <a:schemeClr val="accent1"/>
+                  <a:prstClr val="black"/>
                 </a:solidFill>
-                <a:effectLst>
-                  <a:glow rad="228600">
-                    <a:schemeClr val="tx2">
-                      <a:lumMod val="20000"/>
-                      <a:lumOff val="80000"/>
-                      <a:alpha val="40000"/>
-                    </a:schemeClr>
-                  </a:glow>
-                </a:effectLst>
-                <a:latin typeface="Tahoma" pitchFamily="34" charset="0"/>
-                <a:ea typeface="+mj-ea"/>
-                <a:cs typeface="Tahoma" pitchFamily="34" charset="0"/>
-              </a:defRPr>
-            </a:lvl1pPr>
-          </a:lstStyle>
-          <a:p>
-            <a:pPr lvl="0"/>
-            <a:r>
-              <a:rPr lang="en-US"/>
-              <a:t>Click to edit Master text styles</a:t>
-            </a:r>
+                <a:effectLst/>
+                <a:uLnTx/>
+                <a:uFillTx/>
+                <a:latin typeface="Calibri"/>
+                <a:ea typeface="ＭＳ Ｐゴシック" charset="0"/>
+                <a:cs typeface="+mn-cs"/>
+              </a:rPr>
+              <a:pPr marL="0" marR="0" lvl="0" indent="0" algn="r" defTabSz="685800" rtl="0" eaLnBrk="1" fontAlgn="auto" latinLnBrk="0" hangingPunct="1">
+                <a:lnSpc>
+                  <a:spcPct val="100000"/>
+                </a:lnSpc>
+                <a:spcBef>
+                  <a:spcPts val="0"/>
+                </a:spcBef>
+                <a:spcAft>
+                  <a:spcPts val="0"/>
+                </a:spcAft>
+                <a:buClrTx/>
+                <a:buSzTx/>
+                <a:buFontTx/>
+                <a:buNone/>
+                <a:tabLst/>
+                <a:defRPr/>
+              </a:pPr>
+              <a:t>1</a:t>
+            </a:fld>
+            <a:endParaRPr kumimoji="0" lang="en-US" sz="1200" b="0" i="0" u="none" strike="noStrike" kern="1200" cap="none" spc="0" normalizeH="0" baseline="0" noProof="0">
+              <a:ln>
+                <a:noFill/>
+              </a:ln>
+              <a:solidFill>
+                <a:prstClr val="black"/>
+              </a:solidFill>
+              <a:effectLst/>
+              <a:uLnTx/>
+              <a:uFillTx/>
+              <a:latin typeface="Calibri"/>
+              <a:ea typeface="ＭＳ Ｐゴシック" charset="0"/>
+              <a:cs typeface="+mn-cs"/>
+            </a:endParaRPr>
           </a:p>
         </p:txBody>
       </p:sp>
     </p:spTree>
     <p:extLst>
       <p:ext uri="{BB962C8B-B14F-4D97-AF65-F5344CB8AC3E}">
-        <p14:creationId xmlns:p14="http://schemas.microsoft.com/office/powerpoint/2010/main" val="2428869560"/>
+        <p14:creationId xmlns:p14="http://schemas.microsoft.com/office/powerpoint/2010/main" val="1089079546"/>
       </p:ext>
     </p:extLst>
   </p:cSld>
   <p:clrMapOvr>
     <a:masterClrMapping/>
   </p:clrMapOvr>
-</p:sldLayout>
+</p:notes>
 </file>
 
-<file path=ppt/slideLayouts/slideLayout2.xml><?xml version="1.0" encoding="utf-8"?>
-<p:sldLayout xmlns:a="http://schemas.openxmlformats.org/drawingml/2006/main" xmlns:r="http://schemas.openxmlformats.org/officeDocument/2006/relationships" xmlns:p="http://schemas.openxmlformats.org/presentationml/2006/main" type="obj" preserve="1">
+<file path=ppt/slideLayouts/slideLayout1.xml><?xml version="1.0" encoding="utf-8"?>
+<p:sldLayout xmlns:a="http://schemas.openxmlformats.org/drawingml/2006/main" xmlns:r="http://schemas.openxmlformats.org/officeDocument/2006/relationships" xmlns:p="http://schemas.openxmlformats.org/presentationml/2006/main" preserve="1" userDrawn="1">
   <p:cSld name="Title and Content">
     <p:spTree>
       <p:nvGrpSpPr>
@@ -1653,33 +1114,13 @@
       </p:grpSpPr>
       <p:sp>
         <p:nvSpPr>
-          <p:cNvPr id="2" name="Title 1"/>
-          <p:cNvSpPr>
-            <a:spLocks noGrp="1"/>
-          </p:cNvSpPr>
-          <p:nvPr>
-            <p:ph type="title" hasCustomPrompt="1"/>
-          </p:nvPr>
-        </p:nvSpPr>
-        <p:spPr/>
-        <p:txBody>
-          <a:bodyPr/>
-          <a:lstStyle>
-            <a:lvl1pPr>
-              <a:defRPr baseline="0"/>
-            </a:lvl1pPr>
-          </a:lstStyle>
-          <a:p>
-            <a:r>
-              <a:rPr lang="en-US" dirty="0"/>
-              <a:t>Click to edit title</a:t>
-            </a:r>
-          </a:p>
-        </p:txBody>
-      </p:sp>
-      <p:sp>
-        <p:nvSpPr>
-          <p:cNvPr id="3" name="Content Placeholder 2"/>
+          <p:cNvPr id="9" name="Content Placeholder 2">
+            <a:extLst>
+              <a:ext uri="{FF2B5EF4-FFF2-40B4-BE49-F238E27FC236}">
+                <a16:creationId xmlns:a16="http://schemas.microsoft.com/office/drawing/2014/main" id="{29B88F33-C164-42BE-8BA2-2037279400DF}"/>
+              </a:ext>
+            </a:extLst>
+          </p:cNvPr>
           <p:cNvSpPr>
             <a:spLocks noGrp="1"/>
           </p:cNvSpPr>
@@ -1767,7 +1208,13 @@
       </p:sp>
       <p:sp>
         <p:nvSpPr>
-          <p:cNvPr id="6" name="Slide Number Placeholder 5"/>
+          <p:cNvPr id="10" name="Slide Number Placeholder 5">
+            <a:extLst>
+              <a:ext uri="{FF2B5EF4-FFF2-40B4-BE49-F238E27FC236}">
+                <a16:creationId xmlns:a16="http://schemas.microsoft.com/office/drawing/2014/main" id="{DC2E1F34-927A-427A-808C-72861A0F7337}"/>
+              </a:ext>
+            </a:extLst>
+          </p:cNvPr>
           <p:cNvSpPr>
             <a:spLocks noGrp="1"/>
           </p:cNvSpPr>
@@ -1775,7 +1222,15 @@
             <p:ph type="sldNum" sz="quarter" idx="10"/>
           </p:nvPr>
         </p:nvSpPr>
-        <p:spPr/>
+        <p:spPr>
+          <a:xfrm>
+            <a:off x="8603852" y="6492875"/>
+            <a:ext cx="482561" cy="311471"/>
+          </a:xfrm>
+          <a:prstGeom prst="rect">
+            <a:avLst/>
+          </a:prstGeom>
+        </p:spPr>
         <p:txBody>
           <a:bodyPr/>
           <a:lstStyle/>
@@ -1791,7 +1246,13 @@
       </p:sp>
       <p:sp>
         <p:nvSpPr>
-          <p:cNvPr id="8" name="Rectangle 7"/>
+          <p:cNvPr id="11" name="Rectangle 10">
+            <a:extLst>
+              <a:ext uri="{FF2B5EF4-FFF2-40B4-BE49-F238E27FC236}">
+                <a16:creationId xmlns:a16="http://schemas.microsoft.com/office/drawing/2014/main" id="{72ACAD27-A621-466A-9CD9-78FDF2914AAB}"/>
+              </a:ext>
+            </a:extLst>
+          </p:cNvPr>
           <p:cNvSpPr/>
           <p:nvPr userDrawn="1"/>
         </p:nvSpPr>
@@ -1824,6 +1285,47 @@
           </a:p>
         </p:txBody>
       </p:sp>
+      <p:sp>
+        <p:nvSpPr>
+          <p:cNvPr id="15" name="Title Placeholder 1">
+            <a:extLst>
+              <a:ext uri="{FF2B5EF4-FFF2-40B4-BE49-F238E27FC236}">
+                <a16:creationId xmlns:a16="http://schemas.microsoft.com/office/drawing/2014/main" id="{3D61E50A-BEE9-46B4-81FE-ACD02B6266B8}"/>
+              </a:ext>
+            </a:extLst>
+          </p:cNvPr>
+          <p:cNvSpPr>
+            <a:spLocks noGrp="1"/>
+          </p:cNvSpPr>
+          <p:nvPr>
+            <p:ph type="title"/>
+          </p:nvPr>
+        </p:nvSpPr>
+        <p:spPr>
+          <a:xfrm>
+            <a:off x="1" y="0"/>
+            <a:ext cx="6753339" cy="623986"/>
+          </a:xfrm>
+          <a:prstGeom prst="rect">
+            <a:avLst/>
+          </a:prstGeom>
+          <a:solidFill>
+            <a:srgbClr val="152935"/>
+          </a:solidFill>
+        </p:spPr>
+        <p:txBody>
+          <a:bodyPr vert="horz" lIns="91440" tIns="45720" rIns="91440" bIns="45720" rtlCol="0" anchor="ctr">
+            <a:normAutofit/>
+          </a:bodyPr>
+          <a:lstStyle/>
+          <a:p>
+            <a:r>
+              <a:rPr lang="en-US" dirty="0"/>
+              <a:t>Click to edit Master title style</a:t>
+            </a:r>
+          </a:p>
+        </p:txBody>
+      </p:sp>
     </p:spTree>
     <p:extLst>
       <p:ext uri="{BB962C8B-B14F-4D97-AF65-F5344CB8AC3E}">
@@ -1837,9 +1339,9 @@
 </p:sldLayout>
 </file>
 
-<file path=ppt/slideLayouts/slideLayout3.xml><?xml version="1.0" encoding="utf-8"?>
-<p:sldLayout xmlns:a="http://schemas.openxmlformats.org/drawingml/2006/main" xmlns:r="http://schemas.openxmlformats.org/officeDocument/2006/relationships" xmlns:p="http://schemas.openxmlformats.org/presentationml/2006/main" showMasterSp="0" preserve="1">
-  <p:cSld name="Section Header">
+<file path=ppt/slideLayouts/slideLayout2.xml><?xml version="1.0" encoding="utf-8"?>
+<p:sldLayout xmlns:a="http://schemas.openxmlformats.org/drawingml/2006/main" xmlns:r="http://schemas.openxmlformats.org/officeDocument/2006/relationships" xmlns:p="http://schemas.openxmlformats.org/presentationml/2006/main">
+  <p:cSld name="section, title, text">
     <p:spTree>
       <p:nvGrpSpPr>
         <p:cNvPr id="1" name=""/>
@@ -1866,135 +1368,21 @@
         </p:nvSpPr>
         <p:spPr>
           <a:xfrm>
-            <a:off x="398464" y="2720113"/>
-            <a:ext cx="4248022" cy="1407387"/>
+            <a:off x="228600" y="548640"/>
+            <a:ext cx="4114800" cy="5770733"/>
           </a:xfrm>
         </p:spPr>
         <p:txBody>
-          <a:bodyPr anchor="t">
-            <a:normAutofit/>
-          </a:bodyPr>
-          <a:lstStyle>
-            <a:lvl1pPr algn="l">
-              <a:defRPr sz="3400" b="0" cap="none"/>
-            </a:lvl1pPr>
-          </a:lstStyle>
-          <a:p>
-            <a:r>
-              <a:rPr lang="en-US"/>
+          <a:bodyPr/>
+          <a:lstStyle/>
+          <a:p>
+            <a:r>
+              <a:rPr lang="en-US" dirty="0"/>
               <a:t>Click to edit Master title style</a:t>
             </a:r>
-            <a:endParaRPr lang="en-US" dirty="0"/>
           </a:p>
         </p:txBody>
       </p:sp>
-    </p:spTree>
-    <p:extLst>
-      <p:ext uri="{BB962C8B-B14F-4D97-AF65-F5344CB8AC3E}">
-        <p14:creationId xmlns:p14="http://schemas.microsoft.com/office/powerpoint/2010/main" val="1212436307"/>
-      </p:ext>
-    </p:extLst>
-  </p:cSld>
-  <p:clrMapOvr>
-    <a:masterClrMapping/>
-  </p:clrMapOvr>
-</p:sldLayout>
-</file>
-
-<file path=ppt/slideLayouts/slideLayout4.xml><?xml version="1.0" encoding="utf-8"?>
-<p:sldLayout xmlns:a="http://schemas.openxmlformats.org/drawingml/2006/main" xmlns:r="http://schemas.openxmlformats.org/officeDocument/2006/relationships" xmlns:p="http://schemas.openxmlformats.org/presentationml/2006/main" type="titleOnly" preserve="1">
-  <p:cSld name="Title Only">
-    <p:spTree>
-      <p:nvGrpSpPr>
-        <p:cNvPr id="1" name=""/>
-        <p:cNvGrpSpPr/>
-        <p:nvPr/>
-      </p:nvGrpSpPr>
-      <p:grpSpPr>
-        <a:xfrm>
-          <a:off x="0" y="0"/>
-          <a:ext cx="0" cy="0"/>
-          <a:chOff x="0" y="0"/>
-          <a:chExt cx="0" cy="0"/>
-        </a:xfrm>
-      </p:grpSpPr>
-      <p:sp>
-        <p:nvSpPr>
-          <p:cNvPr id="2" name="Title 1"/>
-          <p:cNvSpPr>
-            <a:spLocks noGrp="1"/>
-          </p:cNvSpPr>
-          <p:nvPr>
-            <p:ph type="title"/>
-          </p:nvPr>
-        </p:nvSpPr>
-        <p:spPr/>
-        <p:txBody>
-          <a:bodyPr/>
-          <a:lstStyle/>
-          <a:p>
-            <a:r>
-              <a:rPr lang="en-US"/>
-              <a:t>Click to edit Master title style</a:t>
-            </a:r>
-            <a:endParaRPr lang="en-US" dirty="0"/>
-          </a:p>
-        </p:txBody>
-      </p:sp>
-      <p:sp>
-        <p:nvSpPr>
-          <p:cNvPr id="4" name="Slide Number Placeholder 3"/>
-          <p:cNvSpPr>
-            <a:spLocks noGrp="1"/>
-          </p:cNvSpPr>
-          <p:nvPr>
-            <p:ph type="sldNum" sz="quarter" idx="10"/>
-          </p:nvPr>
-        </p:nvSpPr>
-        <p:spPr/>
-        <p:txBody>
-          <a:bodyPr/>
-          <a:lstStyle/>
-          <a:p>
-            <a:fld id="{9B6B7A19-9BD6-654B-9E7A-5FCB6FF99B9F}" type="slidenum">
-              <a:rPr lang="en-US" smtClean="0"/>
-              <a:pPr/>
-              <a:t>‹#›</a:t>
-            </a:fld>
-            <a:endParaRPr lang="en-US"/>
-          </a:p>
-        </p:txBody>
-      </p:sp>
-    </p:spTree>
-    <p:extLst>
-      <p:ext uri="{BB962C8B-B14F-4D97-AF65-F5344CB8AC3E}">
-        <p14:creationId xmlns:p14="http://schemas.microsoft.com/office/powerpoint/2010/main" val="3584002149"/>
-      </p:ext>
-    </p:extLst>
-  </p:cSld>
-  <p:clrMapOvr>
-    <a:masterClrMapping/>
-  </p:clrMapOvr>
-</p:sldLayout>
-</file>
-
-<file path=ppt/slideLayouts/slideLayout5.xml><?xml version="1.0" encoding="utf-8"?>
-<p:sldLayout xmlns:a="http://schemas.openxmlformats.org/drawingml/2006/main" xmlns:r="http://schemas.openxmlformats.org/officeDocument/2006/relationships" xmlns:p="http://schemas.openxmlformats.org/presentationml/2006/main" type="blank" preserve="1">
-  <p:cSld name="Blank">
-    <p:spTree>
-      <p:nvGrpSpPr>
-        <p:cNvPr id="1" name=""/>
-        <p:cNvGrpSpPr/>
-        <p:nvPr/>
-      </p:nvGrpSpPr>
-      <p:grpSpPr>
-        <a:xfrm>
-          <a:off x="0" y="0"/>
-          <a:ext cx="0" cy="0"/>
-          <a:chOff x="0" y="0"/>
-          <a:chExt cx="0" cy="0"/>
-        </a:xfrm>
-      </p:grpSpPr>
       <p:sp>
         <p:nvSpPr>
           <p:cNvPr id="3" name="Slide Number Placeholder 2"/>
@@ -2010,7 +1398,7 @@
           <a:bodyPr/>
           <a:lstStyle/>
           <a:p>
-            <a:fld id="{9B6B7A19-9BD6-654B-9E7A-5FCB6FF99B9F}" type="slidenum">
+            <a:fld id="{D0BE6F14-FF48-0F4F-A8AA-2E3F25371E4A}" type="slidenum">
               <a:rPr lang="en-US" smtClean="0"/>
               <a:pPr/>
               <a:t>‹#›</a:t>
@@ -2019,375 +1407,165 @@
           </a:p>
         </p:txBody>
       </p:sp>
-    </p:spTree>
-    <p:extLst>
-      <p:ext uri="{BB962C8B-B14F-4D97-AF65-F5344CB8AC3E}">
-        <p14:creationId xmlns:p14="http://schemas.microsoft.com/office/powerpoint/2010/main" val="2770575985"/>
-      </p:ext>
-    </p:extLst>
-  </p:cSld>
-  <p:clrMapOvr>
-    <a:masterClrMapping/>
-  </p:clrMapOvr>
-</p:sldLayout>
-</file>
-
-<file path=ppt/slideLayouts/slideLayout6.xml><?xml version="1.0" encoding="utf-8"?>
-<p:sldLayout xmlns:a="http://schemas.openxmlformats.org/drawingml/2006/main" xmlns:r="http://schemas.openxmlformats.org/officeDocument/2006/relationships" xmlns:p="http://schemas.openxmlformats.org/presentationml/2006/main" showMasterSp="0" preserve="1">
-  <p:cSld name="1_Title Slide">
-    <p:spTree>
-      <p:nvGrpSpPr>
-        <p:cNvPr id="1" name=""/>
-        <p:cNvGrpSpPr/>
-        <p:nvPr/>
-      </p:nvGrpSpPr>
-      <p:grpSpPr>
-        <a:xfrm>
-          <a:off x="0" y="0"/>
-          <a:ext cx="0" cy="0"/>
-          <a:chOff x="0" y="0"/>
-          <a:chExt cx="0" cy="0"/>
-        </a:xfrm>
-      </p:grpSpPr>
       <p:sp>
         <p:nvSpPr>
-          <p:cNvPr id="2" name="Title 1"/>
+          <p:cNvPr id="6" name="Text Placeholder 5"/>
           <p:cNvSpPr>
             <a:spLocks noGrp="1"/>
           </p:cNvSpPr>
           <p:nvPr>
-            <p:ph type="ctrTitle" hasCustomPrompt="1"/>
+            <p:ph type="body" sz="quarter" idx="12"/>
           </p:nvPr>
         </p:nvSpPr>
         <p:spPr>
           <a:xfrm>
-            <a:off x="426242" y="2242081"/>
-            <a:ext cx="5463272" cy="1040475"/>
+            <a:off x="4800600" y="658368"/>
+            <a:ext cx="4114800" cy="5599640"/>
           </a:xfrm>
         </p:spPr>
         <p:txBody>
-          <a:bodyPr anchor="b" anchorCtr="0">
-            <a:noAutofit/>
-          </a:bodyPr>
+          <a:bodyPr/>
           <a:lstStyle>
             <a:lvl1pPr>
-              <a:defRPr sz="6600"/>
+              <a:spcBef>
+                <a:spcPts val="1100"/>
+              </a:spcBef>
+              <a:spcAft>
+                <a:spcPts val="0"/>
+              </a:spcAft>
+              <a:defRPr/>
             </a:lvl1pPr>
+            <a:lvl2pPr>
+              <a:spcBef>
+                <a:spcPts val="1100"/>
+              </a:spcBef>
+              <a:defRPr/>
+            </a:lvl2pPr>
+            <a:lvl3pPr>
+              <a:spcBef>
+                <a:spcPts val="1100"/>
+              </a:spcBef>
+              <a:defRPr/>
+            </a:lvl3pPr>
+            <a:lvl4pPr>
+              <a:spcBef>
+                <a:spcPts val="1100"/>
+              </a:spcBef>
+              <a:defRPr/>
+            </a:lvl4pPr>
+            <a:lvl5pPr>
+              <a:spcBef>
+                <a:spcPts val="1100"/>
+              </a:spcBef>
+              <a:defRPr/>
+            </a:lvl5pPr>
           </a:lstStyle>
           <a:p>
+            <a:pPr lvl="0"/>
             <a:r>
               <a:rPr lang="en-US" dirty="0"/>
-              <a:t>Thank You</a:t>
+              <a:t>Click to edit Master text styles</a:t>
+            </a:r>
+          </a:p>
+          <a:p>
+            <a:pPr lvl="1"/>
+            <a:r>
+              <a:rPr lang="en-US" dirty="0"/>
+              <a:t>Second level</a:t>
+            </a:r>
+          </a:p>
+          <a:p>
+            <a:pPr lvl="2"/>
+            <a:r>
+              <a:rPr lang="en-US" dirty="0"/>
+              <a:t>Third level</a:t>
+            </a:r>
+          </a:p>
+          <a:p>
+            <a:pPr lvl="3"/>
+            <a:r>
+              <a:rPr lang="en-US" dirty="0"/>
+              <a:t>Fourth level</a:t>
+            </a:r>
+          </a:p>
+          <a:p>
+            <a:pPr lvl="4"/>
+            <a:r>
+              <a:rPr lang="en-US" dirty="0"/>
+              <a:t>Fifth level</a:t>
             </a:r>
           </a:p>
         </p:txBody>
       </p:sp>
-      <p:pic>
-        <p:nvPicPr>
-          <p:cNvPr id="10" name="Picture 9"/>
-          <p:cNvPicPr>
-            <a:picLocks noChangeAspect="1"/>
-          </p:cNvPicPr>
-          <p:nvPr/>
-        </p:nvPicPr>
-        <p:blipFill>
-          <a:blip r:embed="rId2" cstate="email">
-            <a:extLst>
-              <a:ext uri="{28A0092B-C50C-407E-A947-70E740481C1C}">
-                <a14:useLocalDpi xmlns:a14="http://schemas.microsoft.com/office/drawing/2010/main" val="0"/>
-              </a:ext>
-            </a:extLst>
-          </a:blip>
-          <a:stretch>
-            <a:fillRect/>
-          </a:stretch>
-        </p:blipFill>
-        <p:spPr>
-          <a:xfrm>
-            <a:off x="4615500" y="0"/>
-            <a:ext cx="4569500" cy="5719700"/>
-          </a:xfrm>
-          <a:prstGeom prst="rect">
-            <a:avLst/>
-          </a:prstGeom>
-        </p:spPr>
-      </p:pic>
-    </p:spTree>
-    <p:extLst>
-      <p:ext uri="{BB962C8B-B14F-4D97-AF65-F5344CB8AC3E}">
-        <p14:creationId xmlns:p14="http://schemas.microsoft.com/office/powerpoint/2010/main" val="2722423493"/>
-      </p:ext>
-    </p:extLst>
-  </p:cSld>
-  <p:clrMapOvr>
-    <a:masterClrMapping/>
-  </p:clrMapOvr>
-</p:sldLayout>
-</file>
-
-<file path=ppt/slideLayouts/slideLayout7.xml><?xml version="1.0" encoding="utf-8"?>
-<p:sldLayout xmlns:a="http://schemas.openxmlformats.org/drawingml/2006/main" xmlns:r="http://schemas.openxmlformats.org/officeDocument/2006/relationships" xmlns:p="http://schemas.openxmlformats.org/presentationml/2006/main" preserve="1" userDrawn="1">
-  <p:cSld name="1_Two Content">
-    <p:spTree>
-      <p:nvGrpSpPr>
-        <p:cNvPr id="1" name=""/>
-        <p:cNvGrpSpPr/>
-        <p:nvPr/>
-      </p:nvGrpSpPr>
-      <p:grpSpPr>
-        <a:xfrm>
-          <a:off x="0" y="0"/>
-          <a:ext cx="0" cy="0"/>
-          <a:chOff x="0" y="0"/>
-          <a:chExt cx="0" cy="0"/>
-        </a:xfrm>
-      </p:grpSpPr>
       <p:sp>
         <p:nvSpPr>
-          <p:cNvPr id="3" name="Content Placeholder 2"/>
+          <p:cNvPr id="12" name="Text Placeholder 11"/>
           <p:cNvSpPr>
             <a:spLocks noGrp="1"/>
           </p:cNvSpPr>
           <p:nvPr>
-            <p:ph sz="half" idx="1"/>
+            <p:ph type="body" sz="quarter" idx="13"/>
           </p:nvPr>
         </p:nvSpPr>
         <p:spPr>
           <a:xfrm>
-            <a:off x="155574" y="745061"/>
-            <a:ext cx="4214813" cy="5048250"/>
+            <a:off x="228600" y="267418"/>
+            <a:ext cx="4114800" cy="400049"/>
+          </a:xfrm>
+        </p:spPr>
+        <p:txBody>
+          <a:bodyPr/>
+          <a:lstStyle>
+            <a:lvl1pPr>
+              <a:defRPr sz="1100"/>
+            </a:lvl1pPr>
+          </a:lstStyle>
+          <a:p>
+            <a:pPr lvl="0"/>
+            <a:r>
+              <a:rPr lang="en-US"/>
+              <a:t>Click to edit Master text styles</a:t>
+            </a:r>
+          </a:p>
+        </p:txBody>
+      </p:sp>
+      <p:sp>
+        <p:nvSpPr>
+          <p:cNvPr id="7" name="Footer Placeholder 8"/>
+          <p:cNvSpPr>
+            <a:spLocks noGrp="1"/>
+          </p:cNvSpPr>
+          <p:nvPr>
+            <p:ph type="ftr" sz="quarter" idx="3"/>
+          </p:nvPr>
+        </p:nvSpPr>
+        <p:spPr>
+          <a:xfrm>
+            <a:off x="228600" y="6435307"/>
+            <a:ext cx="6400800" cy="182880"/>
           </a:xfrm>
           <a:prstGeom prst="rect">
             <a:avLst/>
           </a:prstGeom>
         </p:spPr>
         <p:txBody>
-          <a:bodyPr/>
+          <a:bodyPr vert="horz" lIns="0" tIns="0" rIns="0" bIns="0" rtlCol="0" anchor="ctr"/>
           <a:lstStyle>
-            <a:lvl1pPr>
-              <a:defRPr sz="2000">
+            <a:lvl1pPr algn="l">
+              <a:defRPr sz="600" baseline="0">
                 <a:solidFill>
                   <a:schemeClr val="tx1"/>
                 </a:solidFill>
-              </a:defRPr>
-            </a:lvl1pPr>
-            <a:lvl2pPr>
-              <a:defRPr sz="1800">
-                <a:solidFill>
-                  <a:schemeClr val="tx1"/>
-                </a:solidFill>
-              </a:defRPr>
-            </a:lvl2pPr>
-            <a:lvl3pPr>
-              <a:defRPr sz="1600">
-                <a:solidFill>
-                  <a:schemeClr val="tx1"/>
-                </a:solidFill>
-              </a:defRPr>
-            </a:lvl3pPr>
-            <a:lvl4pPr>
-              <a:defRPr sz="1400">
-                <a:solidFill>
-                  <a:schemeClr val="tx1"/>
-                </a:solidFill>
-              </a:defRPr>
-            </a:lvl4pPr>
-            <a:lvl5pPr>
-              <a:defRPr sz="1400">
-                <a:solidFill>
-                  <a:schemeClr val="tx1"/>
-                </a:solidFill>
-              </a:defRPr>
-            </a:lvl5pPr>
-            <a:lvl6pPr>
-              <a:defRPr sz="1800"/>
-            </a:lvl6pPr>
-            <a:lvl7pPr>
-              <a:defRPr sz="1800"/>
-            </a:lvl7pPr>
-            <a:lvl8pPr>
-              <a:defRPr sz="1800"/>
-            </a:lvl8pPr>
-            <a:lvl9pPr>
-              <a:defRPr sz="1800"/>
-            </a:lvl9pPr>
-          </a:lstStyle>
-          <a:p>
-            <a:pPr lvl="0"/>
-            <a:r>
-              <a:rPr lang="en-US"/>
-              <a:t>Click to edit Master text styles</a:t>
-            </a:r>
-          </a:p>
-          <a:p>
-            <a:pPr lvl="1"/>
-            <a:r>
-              <a:rPr lang="en-US"/>
-              <a:t>Second level</a:t>
-            </a:r>
-          </a:p>
-          <a:p>
-            <a:pPr lvl="2"/>
-            <a:r>
-              <a:rPr lang="en-US"/>
-              <a:t>Third level</a:t>
-            </a:r>
-          </a:p>
-          <a:p>
-            <a:pPr lvl="3"/>
-            <a:r>
-              <a:rPr lang="en-US"/>
-              <a:t>Fourth level</a:t>
-            </a:r>
-          </a:p>
-          <a:p>
-            <a:pPr lvl="4"/>
-            <a:r>
-              <a:rPr lang="en-US"/>
-              <a:t>Fifth level</a:t>
-            </a:r>
-            <a:endParaRPr lang="en-US" dirty="0"/>
-          </a:p>
-        </p:txBody>
-      </p:sp>
-      <p:sp>
-        <p:nvSpPr>
-          <p:cNvPr id="4" name="Content Placeholder 3"/>
-          <p:cNvSpPr>
-            <a:spLocks noGrp="1"/>
-          </p:cNvSpPr>
-          <p:nvPr>
-            <p:ph sz="half" idx="2"/>
-          </p:nvPr>
-        </p:nvSpPr>
-        <p:spPr>
-          <a:xfrm>
-            <a:off x="4522787" y="745061"/>
-            <a:ext cx="4216400" cy="5048250"/>
-          </a:xfrm>
-          <a:prstGeom prst="rect">
-            <a:avLst/>
-          </a:prstGeom>
-        </p:spPr>
-        <p:txBody>
-          <a:bodyPr/>
-          <a:lstStyle>
-            <a:lvl1pPr>
-              <a:defRPr sz="2000"/>
-            </a:lvl1pPr>
-            <a:lvl2pPr>
-              <a:defRPr sz="1800">
-                <a:solidFill>
-                  <a:schemeClr val="tx1"/>
-                </a:solidFill>
-              </a:defRPr>
-            </a:lvl2pPr>
-            <a:lvl3pPr>
-              <a:defRPr sz="1600">
-                <a:solidFill>
-                  <a:schemeClr val="tx1"/>
-                </a:solidFill>
-              </a:defRPr>
-            </a:lvl3pPr>
-            <a:lvl4pPr>
-              <a:defRPr sz="1400">
-                <a:solidFill>
-                  <a:schemeClr val="tx1"/>
-                </a:solidFill>
-              </a:defRPr>
-            </a:lvl4pPr>
-            <a:lvl5pPr>
-              <a:defRPr sz="1400">
-                <a:solidFill>
-                  <a:schemeClr val="tx1"/>
-                </a:solidFill>
-              </a:defRPr>
-            </a:lvl5pPr>
-            <a:lvl6pPr>
-              <a:defRPr sz="1800"/>
-            </a:lvl6pPr>
-            <a:lvl7pPr>
-              <a:defRPr sz="1800"/>
-            </a:lvl7pPr>
-            <a:lvl8pPr>
-              <a:defRPr sz="1800"/>
-            </a:lvl8pPr>
-            <a:lvl9pPr>
-              <a:defRPr sz="1800"/>
-            </a:lvl9pPr>
-          </a:lstStyle>
-          <a:p>
-            <a:pPr lvl="0"/>
-            <a:r>
-              <a:rPr lang="en-US"/>
-              <a:t>Click to edit Master text styles</a:t>
-            </a:r>
-          </a:p>
-          <a:p>
-            <a:pPr lvl="1"/>
-            <a:r>
-              <a:rPr lang="en-US"/>
-              <a:t>Second level</a:t>
-            </a:r>
-          </a:p>
-          <a:p>
-            <a:pPr lvl="2"/>
-            <a:r>
-              <a:rPr lang="en-US"/>
-              <a:t>Third level</a:t>
-            </a:r>
-          </a:p>
-          <a:p>
-            <a:pPr lvl="3"/>
-            <a:r>
-              <a:rPr lang="en-US"/>
-              <a:t>Fourth level</a:t>
-            </a:r>
-          </a:p>
-          <a:p>
-            <a:pPr lvl="4"/>
-            <a:r>
-              <a:rPr lang="en-US"/>
-              <a:t>Fifth level</a:t>
-            </a:r>
-            <a:endParaRPr lang="en-US" dirty="0"/>
-          </a:p>
-        </p:txBody>
-      </p:sp>
-      <p:sp>
-        <p:nvSpPr>
-          <p:cNvPr id="5" name="Title 1"/>
-          <p:cNvSpPr>
-            <a:spLocks noGrp="1"/>
-          </p:cNvSpPr>
-          <p:nvPr>
-            <p:ph type="title"/>
-          </p:nvPr>
-        </p:nvSpPr>
-        <p:spPr>
-          <a:xfrm>
-            <a:off x="132996" y="119587"/>
-            <a:ext cx="8616950" cy="457200"/>
-          </a:xfrm>
-          <a:prstGeom prst="rect">
-            <a:avLst/>
-          </a:prstGeom>
-        </p:spPr>
-        <p:txBody>
-          <a:bodyPr/>
-          <a:lstStyle>
-            <a:lvl1pPr>
-              <a:defRPr sz="2400" b="1">
-                <a:solidFill>
-                  <a:schemeClr val="tx1"/>
-                </a:solidFill>
+                <a:latin typeface="+mn-lt"/>
+                <a:ea typeface="Arial" charset="0"/>
+                <a:cs typeface="Arial" charset="0"/>
               </a:defRPr>
             </a:lvl1pPr>
           </a:lstStyle>
           <a:p>
             <a:r>
-              <a:rPr lang="en-US"/>
-              <a:t>Click to edit Master title style</a:t>
+              <a:rPr lang="de-DE"/>
+              <a:t>IBM Watson IoT / © 2018 IBM Corporation</a:t>
             </a:r>
             <a:endParaRPr lang="en-US" dirty="0"/>
           </a:p>
@@ -2396,165 +1574,7 @@
     </p:spTree>
     <p:extLst>
       <p:ext uri="{BB962C8B-B14F-4D97-AF65-F5344CB8AC3E}">
-        <p14:creationId xmlns:p14="http://schemas.microsoft.com/office/powerpoint/2010/main" val="1873764441"/>
-      </p:ext>
-    </p:extLst>
-  </p:cSld>
-  <p:clrMapOvr>
-    <a:masterClrMapping/>
-  </p:clrMapOvr>
-</p:sldLayout>
-</file>
-
-<file path=ppt/slideLayouts/slideLayout8.xml><?xml version="1.0" encoding="utf-8"?>
-<p:sldLayout xmlns:a="http://schemas.openxmlformats.org/drawingml/2006/main" xmlns:r="http://schemas.openxmlformats.org/officeDocument/2006/relationships" xmlns:p="http://schemas.openxmlformats.org/presentationml/2006/main" preserve="1" userDrawn="1">
-  <p:cSld name="1_Title and Vertical Text">
-    <p:spTree>
-      <p:nvGrpSpPr>
-        <p:cNvPr id="1" name=""/>
-        <p:cNvGrpSpPr/>
-        <p:nvPr/>
-      </p:nvGrpSpPr>
-      <p:grpSpPr>
-        <a:xfrm>
-          <a:off x="0" y="0"/>
-          <a:ext cx="0" cy="0"/>
-          <a:chOff x="0" y="0"/>
-          <a:chExt cx="0" cy="0"/>
-        </a:xfrm>
-      </p:grpSpPr>
-      <p:sp>
-        <p:nvSpPr>
-          <p:cNvPr id="3" name="Vertical Text Placeholder 2"/>
-          <p:cNvSpPr>
-            <a:spLocks noGrp="1"/>
-          </p:cNvSpPr>
-          <p:nvPr>
-            <p:ph type="body" orient="vert" idx="1"/>
-          </p:nvPr>
-        </p:nvSpPr>
-        <p:spPr>
-          <a:xfrm>
-            <a:off x="257175" y="1873250"/>
-            <a:ext cx="8583613" cy="4495800"/>
-          </a:xfrm>
-          <a:prstGeom prst="rect">
-            <a:avLst/>
-          </a:prstGeom>
-        </p:spPr>
-        <p:txBody>
-          <a:bodyPr vert="eaVert"/>
-          <a:lstStyle>
-            <a:lvl2pPr>
-              <a:defRPr>
-                <a:solidFill>
-                  <a:schemeClr val="tx1"/>
-                </a:solidFill>
-              </a:defRPr>
-            </a:lvl2pPr>
-            <a:lvl3pPr>
-              <a:defRPr>
-                <a:solidFill>
-                  <a:schemeClr val="tx1"/>
-                </a:solidFill>
-              </a:defRPr>
-            </a:lvl3pPr>
-            <a:lvl4pPr>
-              <a:defRPr>
-                <a:solidFill>
-                  <a:schemeClr val="tx1"/>
-                </a:solidFill>
-              </a:defRPr>
-            </a:lvl4pPr>
-            <a:lvl5pPr>
-              <a:defRPr>
-                <a:solidFill>
-                  <a:schemeClr val="tx1"/>
-                </a:solidFill>
-              </a:defRPr>
-            </a:lvl5pPr>
-          </a:lstStyle>
-          <a:p>
-            <a:pPr lvl="0"/>
-            <a:r>
-              <a:rPr lang="en-US"/>
-              <a:t>Click to edit Master text styles</a:t>
-            </a:r>
-          </a:p>
-          <a:p>
-            <a:pPr lvl="1"/>
-            <a:r>
-              <a:rPr lang="en-US"/>
-              <a:t>Second level</a:t>
-            </a:r>
-          </a:p>
-          <a:p>
-            <a:pPr lvl="2"/>
-            <a:r>
-              <a:rPr lang="en-US"/>
-              <a:t>Third level</a:t>
-            </a:r>
-          </a:p>
-          <a:p>
-            <a:pPr lvl="3"/>
-            <a:r>
-              <a:rPr lang="en-US"/>
-              <a:t>Fourth level</a:t>
-            </a:r>
-          </a:p>
-          <a:p>
-            <a:pPr lvl="4"/>
-            <a:r>
-              <a:rPr lang="en-US"/>
-              <a:t>Fifth level</a:t>
-            </a:r>
-            <a:endParaRPr lang="en-US" dirty="0"/>
-          </a:p>
-        </p:txBody>
-      </p:sp>
-      <p:sp>
-        <p:nvSpPr>
-          <p:cNvPr id="4" name="Title 1"/>
-          <p:cNvSpPr>
-            <a:spLocks noGrp="1"/>
-          </p:cNvSpPr>
-          <p:nvPr>
-            <p:ph type="title"/>
-          </p:nvPr>
-        </p:nvSpPr>
-        <p:spPr>
-          <a:xfrm>
-            <a:off x="132996" y="119587"/>
-            <a:ext cx="8616950" cy="457200"/>
-          </a:xfrm>
-          <a:prstGeom prst="rect">
-            <a:avLst/>
-          </a:prstGeom>
-        </p:spPr>
-        <p:txBody>
-          <a:bodyPr/>
-          <a:lstStyle>
-            <a:lvl1pPr>
-              <a:defRPr sz="2400" b="1">
-                <a:solidFill>
-                  <a:schemeClr val="tx1"/>
-                </a:solidFill>
-              </a:defRPr>
-            </a:lvl1pPr>
-          </a:lstStyle>
-          <a:p>
-            <a:r>
-              <a:rPr lang="en-US"/>
-              <a:t>Click to edit Master title style</a:t>
-            </a:r>
-            <a:endParaRPr lang="en-US" dirty="0"/>
-          </a:p>
-        </p:txBody>
-      </p:sp>
-    </p:spTree>
-    <p:extLst>
-      <p:ext uri="{BB962C8B-B14F-4D97-AF65-F5344CB8AC3E}">
-        <p14:creationId xmlns:p14="http://schemas.microsoft.com/office/powerpoint/2010/main" val="2366892523"/>
+        <p14:creationId xmlns:p14="http://schemas.microsoft.com/office/powerpoint/2010/main" val="167505763"/>
       </p:ext>
     </p:extLst>
   </p:cSld>
@@ -2586,39 +1606,66 @@
           <a:chExt cx="0" cy="0"/>
         </a:xfrm>
       </p:grpSpPr>
-      <p:pic>
-        <p:nvPicPr>
-          <p:cNvPr id="7" name="Picture 6"/>
-          <p:cNvPicPr>
-            <a:picLocks noChangeAspect="1"/>
-          </p:cNvPicPr>
-          <p:nvPr userDrawn="1"/>
-        </p:nvPicPr>
-        <p:blipFill>
-          <a:blip r:embed="rId10">
+      <p:sp>
+        <p:nvSpPr>
+          <p:cNvPr id="3" name="Rectangle 2">
             <a:extLst>
-              <a:ext uri="{28A0092B-C50C-407E-A947-70E740481C1C}">
-                <a14:useLocalDpi xmlns:a14="http://schemas.microsoft.com/office/drawing/2010/main" val="0"/>
+              <a:ext uri="{FF2B5EF4-FFF2-40B4-BE49-F238E27FC236}">
+                <a16:creationId xmlns:a16="http://schemas.microsoft.com/office/drawing/2014/main" id="{F906A8A2-C8BA-4E01-8F9D-CE9A15B020E0}"/>
               </a:ext>
             </a:extLst>
-          </a:blip>
-          <a:stretch>
-            <a:fillRect/>
-          </a:stretch>
-        </p:blipFill>
+          </p:cNvPr>
+          <p:cNvSpPr/>
+          <p:nvPr userDrawn="1"/>
+        </p:nvSpPr>
         <p:spPr>
           <a:xfrm>
-            <a:off x="0" y="12637"/>
-            <a:ext cx="9144793" cy="714438"/>
+            <a:off x="6753340" y="0"/>
+            <a:ext cx="2390660" cy="623986"/>
           </a:xfrm>
           <a:prstGeom prst="rect">
             <a:avLst/>
           </a:prstGeom>
+          <a:solidFill>
+            <a:srgbClr val="152935"/>
+          </a:solidFill>
+          <a:ln>
+            <a:noFill/>
+          </a:ln>
+          <a:effectLst/>
         </p:spPr>
-      </p:pic>
+        <p:style>
+          <a:lnRef idx="1">
+            <a:schemeClr val="accent1"/>
+          </a:lnRef>
+          <a:fillRef idx="3">
+            <a:schemeClr val="accent1"/>
+          </a:fillRef>
+          <a:effectRef idx="2">
+            <a:schemeClr val="accent1"/>
+          </a:effectRef>
+          <a:fontRef idx="minor">
+            <a:schemeClr val="lt1"/>
+          </a:fontRef>
+        </p:style>
+        <p:txBody>
+          <a:bodyPr rtlCol="0" anchor="ctr"/>
+          <a:lstStyle/>
+          <a:p>
+            <a:pPr algn="ctr"/>
+            <a:endParaRPr lang="en-US"/>
+          </a:p>
+        </p:txBody>
+      </p:sp>
       <p:sp>
         <p:nvSpPr>
-          <p:cNvPr id="2" name="Title Placeholder 1"/>
+          <p:cNvPr id="23" name="Title Placeholder 1">
+            <a:extLst>
+              <a:ext uri="{FF2B5EF4-FFF2-40B4-BE49-F238E27FC236}">
+                <a16:creationId xmlns:a16="http://schemas.microsoft.com/office/drawing/2014/main" id="{E0832A32-B2FF-4130-B5F0-944D2D752B2F}"/>
+              </a:ext>
+            </a:extLst>
+          </p:cNvPr>
           <p:cNvSpPr>
             <a:spLocks noGrp="1"/>
           </p:cNvSpPr>
@@ -2628,12 +1675,15 @@
         </p:nvSpPr>
         <p:spPr>
           <a:xfrm>
-            <a:off x="98057" y="48747"/>
-            <a:ext cx="7648617" cy="623986"/>
+            <a:off x="1" y="0"/>
+            <a:ext cx="6753339" cy="623986"/>
           </a:xfrm>
           <a:prstGeom prst="rect">
             <a:avLst/>
           </a:prstGeom>
+          <a:solidFill>
+            <a:srgbClr val="152935"/>
+          </a:solidFill>
         </p:spPr>
         <p:txBody>
           <a:bodyPr vert="horz" lIns="91440" tIns="45720" rIns="91440" bIns="45720" rtlCol="0" anchor="ctr">
@@ -2650,7 +1700,13 @@
       </p:sp>
       <p:sp>
         <p:nvSpPr>
-          <p:cNvPr id="9" name="Slide Number Placeholder 3"/>
+          <p:cNvPr id="24" name="Slide Number Placeholder 3">
+            <a:extLst>
+              <a:ext uri="{FF2B5EF4-FFF2-40B4-BE49-F238E27FC236}">
+                <a16:creationId xmlns:a16="http://schemas.microsoft.com/office/drawing/2014/main" id="{C43A8FC5-75E4-4FA8-A7E7-EFAADBF8701B}"/>
+              </a:ext>
+            </a:extLst>
+          </p:cNvPr>
           <p:cNvSpPr>
             <a:spLocks noGrp="1"/>
           </p:cNvSpPr>
@@ -2692,14 +1748,20 @@
       </p:sp>
       <p:pic>
         <p:nvPicPr>
-          <p:cNvPr id="8" name="Picture 3"/>
+          <p:cNvPr id="25" name="Picture 3">
+            <a:extLst>
+              <a:ext uri="{FF2B5EF4-FFF2-40B4-BE49-F238E27FC236}">
+                <a16:creationId xmlns:a16="http://schemas.microsoft.com/office/drawing/2014/main" id="{7B60C750-8D8E-44E3-A3D9-1FB6A6C7DF5B}"/>
+              </a:ext>
+            </a:extLst>
+          </p:cNvPr>
           <p:cNvPicPr>
             <a:picLocks noChangeAspect="1" noChangeArrowheads="1"/>
           </p:cNvPicPr>
           <p:nvPr userDrawn="1"/>
         </p:nvPicPr>
         <p:blipFill>
-          <a:blip r:embed="rId11">
+          <a:blip r:embed="rId3">
             <a:extLst>
               <a:ext uri="{28A0092B-C50C-407E-A947-70E740481C1C}">
                 <a14:useLocalDpi xmlns:a14="http://schemas.microsoft.com/office/drawing/2010/main" val="0"/>
@@ -2745,56 +1807,147 @@
       </p:pic>
       <p:pic>
         <p:nvPicPr>
-          <p:cNvPr id="10" name="Picture 7" descr="C:\Documents and Settings\Administrator\Desktop\Picture1.png"/>
+          <p:cNvPr id="26" name="Picture 25">
+            <a:extLst>
+              <a:ext uri="{FF2B5EF4-FFF2-40B4-BE49-F238E27FC236}">
+                <a16:creationId xmlns:a16="http://schemas.microsoft.com/office/drawing/2014/main" id="{169A2087-F403-492F-A6F1-C4F637EC7547}"/>
+              </a:ext>
+            </a:extLst>
+          </p:cNvPr>
           <p:cNvPicPr>
-            <a:picLocks noChangeAspect="1" noChangeArrowheads="1"/>
+            <a:picLocks noChangeAspect="1"/>
+          </p:cNvPicPr>
+          <p:nvPr userDrawn="1"/>
+        </p:nvPicPr>
+        <p:blipFill rotWithShape="1">
+          <a:blip r:embed="rId4" cstate="screen">
+            <a:extLst>
+              <a:ext uri="{28A0092B-C50C-407E-A947-70E740481C1C}">
+                <a14:useLocalDpi xmlns:a14="http://schemas.microsoft.com/office/drawing/2010/main"/>
+              </a:ext>
+            </a:extLst>
+          </a:blip>
+          <a:srcRect l="27119" t="24290" r="18050" b="20157"/>
+          <a:stretch/>
+        </p:blipFill>
+        <p:spPr>
+          <a:xfrm>
+            <a:off x="8440534" y="-48360"/>
+            <a:ext cx="809196" cy="720705"/>
+          </a:xfrm>
+          <a:prstGeom prst="rect">
+            <a:avLst/>
+          </a:prstGeom>
+        </p:spPr>
+      </p:pic>
+      <p:pic>
+        <p:nvPicPr>
+          <p:cNvPr id="27" name="Picture 26">
+            <a:extLst>
+              <a:ext uri="{FF2B5EF4-FFF2-40B4-BE49-F238E27FC236}">
+                <a16:creationId xmlns:a16="http://schemas.microsoft.com/office/drawing/2014/main" id="{6C949EFC-FB1C-411C-9778-B876B96C1801}"/>
+              </a:ext>
+            </a:extLst>
+          </p:cNvPr>
+          <p:cNvPicPr>
+            <a:picLocks noChangeAspect="1"/>
           </p:cNvPicPr>
           <p:nvPr userDrawn="1"/>
         </p:nvPicPr>
         <p:blipFill>
-          <a:blip r:embed="rId12" cstate="email">
+          <a:blip r:embed="rId5" cstate="screen">
             <a:extLst>
               <a:ext uri="{28A0092B-C50C-407E-A947-70E740481C1C}">
-                <a14:useLocalDpi xmlns:a14="http://schemas.microsoft.com/office/drawing/2010/main" val="0"/>
+                <a14:useLocalDpi xmlns:a14="http://schemas.microsoft.com/office/drawing/2010/main"/>
               </a:ext>
             </a:extLst>
           </a:blip>
-          <a:srcRect/>
           <a:stretch>
             <a:fillRect/>
           </a:stretch>
         </p:blipFill>
-        <p:spPr bwMode="auto">
+        <p:spPr>
           <a:xfrm>
-            <a:off x="7827962" y="-68996"/>
-            <a:ext cx="1316038" cy="669925"/>
+            <a:off x="4625548" y="963975"/>
+            <a:ext cx="2160843" cy="1927954"/>
           </a:xfrm>
           <a:prstGeom prst="rect">
             <a:avLst/>
           </a:prstGeom>
-          <a:noFill/>
-          <a:ln>
-            <a:noFill/>
-          </a:ln>
-          <a:extLst>
-            <a:ext uri="{909E8E84-426E-40dd-AFC4-6F175D3DCCD1}">
-              <a14:hiddenFill xmlns:a14="http://schemas.microsoft.com/office/drawing/2010/main" xmlns="">
-                <a:solidFill>
-                  <a:srgbClr val="FFFFFF"/>
-                </a:solidFill>
-              </a14:hiddenFill>
-            </a:ext>
-            <a:ext uri="{91240B29-F687-4f45-9708-019B960494DF}">
-              <a14:hiddenLine xmlns:a14="http://schemas.microsoft.com/office/drawing/2010/main" xmlns="" w="9525">
-                <a:solidFill>
-                  <a:srgbClr val="000000"/>
-                </a:solidFill>
-                <a:miter lim="800000"/>
-                <a:headEnd/>
-                <a:tailEnd/>
-              </a14:hiddenLine>
-            </a:ext>
-          </a:extLst>
+        </p:spPr>
+      </p:pic>
+      <p:sp>
+        <p:nvSpPr>
+          <p:cNvPr id="28" name="Rectangle 27">
+            <a:extLst>
+              <a:ext uri="{FF2B5EF4-FFF2-40B4-BE49-F238E27FC236}">
+                <a16:creationId xmlns:a16="http://schemas.microsoft.com/office/drawing/2014/main" id="{87265E24-3883-4EA7-9A2C-223B94614F67}"/>
+              </a:ext>
+            </a:extLst>
+          </p:cNvPr>
+          <p:cNvSpPr/>
+          <p:nvPr userDrawn="1"/>
+        </p:nvSpPr>
+        <p:spPr>
+          <a:xfrm>
+            <a:off x="3822905" y="983974"/>
+            <a:ext cx="749095" cy="523220"/>
+          </a:xfrm>
+          <a:prstGeom prst="rect">
+            <a:avLst/>
+          </a:prstGeom>
+        </p:spPr>
+        <p:txBody>
+          <a:bodyPr wrap="square" lIns="0" tIns="0" rIns="0" bIns="0" rtlCol="0" anchor="ctr">
+            <a:noAutofit/>
+          </a:bodyPr>
+          <a:lstStyle/>
+          <a:p>
+            <a:pPr algn="ctr"/>
+            <a:endParaRPr lang="en-US" sz="1200" dirty="0" err="1">
+              <a:solidFill>
+                <a:srgbClr val="FFFFFF"/>
+              </a:solidFill>
+              <a:latin typeface="Arial"/>
+              <a:cs typeface="Arial"/>
+            </a:endParaRPr>
+          </a:p>
+        </p:txBody>
+      </p:sp>
+      <p:pic>
+        <p:nvPicPr>
+          <p:cNvPr id="29" name="Picture 28">
+            <a:extLst>
+              <a:ext uri="{FF2B5EF4-FFF2-40B4-BE49-F238E27FC236}">
+                <a16:creationId xmlns:a16="http://schemas.microsoft.com/office/drawing/2014/main" id="{93D35386-441F-46A0-B8CF-A6A54DFBF07B}"/>
+              </a:ext>
+            </a:extLst>
+          </p:cNvPr>
+          <p:cNvPicPr>
+            <a:picLocks noChangeAspect="1"/>
+          </p:cNvPicPr>
+          <p:nvPr userDrawn="1"/>
+        </p:nvPicPr>
+        <p:blipFill>
+          <a:blip r:embed="rId5" cstate="screen">
+            <a:extLst>
+              <a:ext uri="{28A0092B-C50C-407E-A947-70E740481C1C}">
+                <a14:useLocalDpi xmlns:a14="http://schemas.microsoft.com/office/drawing/2010/main"/>
+              </a:ext>
+            </a:extLst>
+          </a:blip>
+          <a:stretch>
+            <a:fillRect/>
+          </a:stretch>
+        </p:blipFill>
+        <p:spPr>
+          <a:xfrm>
+            <a:off x="6566053" y="0"/>
+            <a:ext cx="2037799" cy="623986"/>
+          </a:xfrm>
+          <a:prstGeom prst="rect">
+            <a:avLst/>
+          </a:prstGeom>
         </p:spPr>
       </p:pic>
     </p:spTree>
@@ -2806,14 +1959,7 @@
   </p:cSld>
   <p:clrMap bg1="lt1" tx1="dk1" bg2="lt2" tx2="dk2" accent1="accent1" accent2="accent2" accent3="accent3" accent4="accent4" accent5="accent5" accent6="accent6" hlink="hlink" folHlink="folHlink"/>
   <p:sldLayoutIdLst>
-    <p:sldLayoutId id="2147483756" r:id="rId1"/>
-    <p:sldLayoutId id="2147483757" r:id="rId2"/>
-    <p:sldLayoutId id="2147483758" r:id="rId3"/>
-    <p:sldLayoutId id="2147483759" r:id="rId4"/>
-    <p:sldLayoutId id="2147483760" r:id="rId5"/>
-    <p:sldLayoutId id="2147483761" r:id="rId6"/>
-    <p:sldLayoutId id="2147483714" r:id="rId7"/>
-    <p:sldLayoutId id="2147483719" r:id="rId8"/>
+    <p:sldLayoutId id="2147483757" r:id="rId1"/>
   </p:sldLayoutIdLst>
   <p:hf hdr="0" ftr="0" dt="0"/>
   <p:txStyles>
@@ -2828,9 +1974,7 @@
         <a:buNone/>
         <a:defRPr sz="2800" kern="1200" baseline="0">
           <a:solidFill>
-            <a:schemeClr val="tx2">
-              <a:lumMod val="75000"/>
-            </a:schemeClr>
+            <a:schemeClr val="bg1"/>
           </a:solidFill>
           <a:latin typeface="+mj-lt"/>
           <a:ea typeface="+mj-ea"/>
@@ -3078,9 +2222,17 @@
 </p:sldMaster>
 </file>
 
-<file path=ppt/slides/slide1.xml><?xml version="1.0" encoding="utf-8"?>
-<p:sld xmlns:a="http://schemas.openxmlformats.org/drawingml/2006/main" xmlns:r="http://schemas.openxmlformats.org/officeDocument/2006/relationships" xmlns:p="http://schemas.openxmlformats.org/presentationml/2006/main">
+<file path=ppt/slideMasters/slideMaster2.xml><?xml version="1.0" encoding="utf-8"?>
+<p:sldMaster xmlns:a="http://schemas.openxmlformats.org/drawingml/2006/main" xmlns:r="http://schemas.openxmlformats.org/officeDocument/2006/relationships" xmlns:p="http://schemas.openxmlformats.org/presentationml/2006/main" preserve="1">
   <p:cSld>
+    <p:bg>
+      <p:bgPr>
+        <a:solidFill>
+          <a:schemeClr val="bg2"/>
+        </a:solidFill>
+        <a:effectLst/>
+      </p:bgPr>
+    </p:bg>
     <p:spTree>
       <p:nvGrpSpPr>
         <p:cNvPr id="1" name=""/>
@@ -3097,12 +2249,739 @@
       </p:grpSpPr>
       <p:sp>
         <p:nvSpPr>
-          <p:cNvPr id="4" name="Text Placeholder 3"/>
+          <p:cNvPr id="2" name="Title Placeholder 1"/>
           <p:cNvSpPr>
             <a:spLocks noGrp="1"/>
           </p:cNvSpPr>
           <p:nvPr>
-            <p:ph type="body" sz="quarter" idx="10"/>
+            <p:ph type="title"/>
+          </p:nvPr>
+        </p:nvSpPr>
+        <p:spPr>
+          <a:xfrm>
+            <a:off x="228600" y="229668"/>
+            <a:ext cx="2103120" cy="5791200"/>
+          </a:xfrm>
+          <a:prstGeom prst="rect">
+            <a:avLst/>
+          </a:prstGeom>
+        </p:spPr>
+        <p:txBody>
+          <a:bodyPr vert="horz" lIns="0" tIns="0" rIns="0" bIns="0" rtlCol="0" anchor="t" anchorCtr="0">
+            <a:noAutofit/>
+          </a:bodyPr>
+          <a:lstStyle/>
+          <a:p>
+            <a:r>
+              <a:rPr lang="en-US" noProof="0" dirty="0"/>
+              <a:t>Click to edit Master title style</a:t>
+            </a:r>
+          </a:p>
+        </p:txBody>
+      </p:sp>
+      <p:sp>
+        <p:nvSpPr>
+          <p:cNvPr id="3" name="Text Placeholder 2"/>
+          <p:cNvSpPr>
+            <a:spLocks noGrp="1"/>
+          </p:cNvSpPr>
+          <p:nvPr>
+            <p:ph type="body" idx="1"/>
+          </p:nvPr>
+        </p:nvSpPr>
+        <p:spPr>
+          <a:xfrm>
+            <a:off x="2408195" y="229668"/>
+            <a:ext cx="2105840" cy="5791200"/>
+          </a:xfrm>
+          <a:prstGeom prst="rect">
+            <a:avLst/>
+          </a:prstGeom>
+        </p:spPr>
+        <p:txBody>
+          <a:bodyPr vert="horz" lIns="0" tIns="0" rIns="0" bIns="0" rtlCol="0">
+            <a:noAutofit/>
+          </a:bodyPr>
+          <a:lstStyle/>
+          <a:p>
+            <a:pPr lvl="0"/>
+            <a:r>
+              <a:rPr lang="en-US" noProof="0" dirty="0"/>
+              <a:t>Click to edit Master text styles</a:t>
+            </a:r>
+          </a:p>
+          <a:p>
+            <a:pPr lvl="1"/>
+            <a:r>
+              <a:rPr lang="en-US" noProof="0" dirty="0"/>
+              <a:t>Second level</a:t>
+            </a:r>
+          </a:p>
+          <a:p>
+            <a:pPr lvl="2"/>
+            <a:r>
+              <a:rPr lang="en-US" noProof="0" dirty="0"/>
+              <a:t>Third level</a:t>
+            </a:r>
+          </a:p>
+          <a:p>
+            <a:pPr lvl="3"/>
+            <a:r>
+              <a:rPr lang="en-US" noProof="0" dirty="0"/>
+              <a:t>Fourth level</a:t>
+            </a:r>
+          </a:p>
+          <a:p>
+            <a:pPr lvl="4"/>
+            <a:r>
+              <a:rPr lang="en-US" noProof="0" dirty="0"/>
+              <a:t>Fifth level</a:t>
+            </a:r>
+          </a:p>
+        </p:txBody>
+      </p:sp>
+      <p:sp>
+        <p:nvSpPr>
+          <p:cNvPr id="4" name="Date Placeholder 3"/>
+          <p:cNvSpPr>
+            <a:spLocks noGrp="1"/>
+          </p:cNvSpPr>
+          <p:nvPr>
+            <p:ph type="dt" sz="half" idx="2"/>
+          </p:nvPr>
+        </p:nvSpPr>
+        <p:spPr>
+          <a:xfrm>
+            <a:off x="7107556" y="6291072"/>
+            <a:ext cx="1809432" cy="268224"/>
+          </a:xfrm>
+          <a:prstGeom prst="rect">
+            <a:avLst/>
+          </a:prstGeom>
+        </p:spPr>
+        <p:txBody>
+          <a:bodyPr vert="horz" lIns="0" tIns="0" rIns="0" bIns="0" rtlCol="0" anchor="b" anchorCtr="0"/>
+          <a:lstStyle>
+            <a:lvl1pPr algn="r">
+              <a:defRPr sz="500" b="0" i="0">
+                <a:solidFill>
+                  <a:srgbClr val="FFFFFF"/>
+                </a:solidFill>
+                <a:latin typeface="IBM Plex Sans Regular" charset="0"/>
+                <a:cs typeface="IBM Plex Sans Regular" charset="0"/>
+              </a:defRPr>
+            </a:lvl1pPr>
+          </a:lstStyle>
+          <a:p>
+            <a:endParaRPr lang="en-US" dirty="0"/>
+          </a:p>
+        </p:txBody>
+      </p:sp>
+      <p:sp>
+        <p:nvSpPr>
+          <p:cNvPr id="5" name="Footer Placeholder 4"/>
+          <p:cNvSpPr>
+            <a:spLocks noGrp="1"/>
+          </p:cNvSpPr>
+          <p:nvPr>
+            <p:ph type="ftr" sz="quarter" idx="3"/>
+          </p:nvPr>
+        </p:nvSpPr>
+        <p:spPr>
+          <a:xfrm>
+            <a:off x="603504" y="6291072"/>
+            <a:ext cx="2895600" cy="268224"/>
+          </a:xfrm>
+          <a:prstGeom prst="rect">
+            <a:avLst/>
+          </a:prstGeom>
+        </p:spPr>
+        <p:txBody>
+          <a:bodyPr vert="horz" lIns="0" tIns="0" rIns="0" bIns="0" rtlCol="0" anchor="b" anchorCtr="0"/>
+          <a:lstStyle>
+            <a:lvl1pPr algn="l">
+              <a:defRPr sz="500" b="0" i="0">
+                <a:solidFill>
+                  <a:srgbClr val="FFFFFF"/>
+                </a:solidFill>
+                <a:latin typeface="IBM Plex Sans Regular" charset="0"/>
+                <a:cs typeface="IBM Plex Sans Regular" charset="0"/>
+              </a:defRPr>
+            </a:lvl1pPr>
+          </a:lstStyle>
+          <a:p>
+            <a:r>
+              <a:rPr lang="en-US"/>
+              <a:t>IBM Watson IoT / © 2018 IBM Corporation</a:t>
+            </a:r>
+            <a:endParaRPr lang="en-US" dirty="0"/>
+          </a:p>
+        </p:txBody>
+      </p:sp>
+      <p:sp>
+        <p:nvSpPr>
+          <p:cNvPr id="6" name="Slide Number Placeholder 5"/>
+          <p:cNvSpPr>
+            <a:spLocks noGrp="1"/>
+          </p:cNvSpPr>
+          <p:nvPr>
+            <p:ph type="sldNum" sz="quarter" idx="4"/>
+          </p:nvPr>
+        </p:nvSpPr>
+        <p:spPr>
+          <a:xfrm>
+            <a:off x="230188" y="6291072"/>
+            <a:ext cx="210312" cy="268224"/>
+          </a:xfrm>
+          <a:prstGeom prst="rect">
+            <a:avLst/>
+          </a:prstGeom>
+        </p:spPr>
+        <p:txBody>
+          <a:bodyPr vert="horz" lIns="0" tIns="0" rIns="0" bIns="0" rtlCol="0" anchor="b" anchorCtr="0"/>
+          <a:lstStyle>
+            <a:lvl1pPr algn="l">
+              <a:defRPr sz="500" b="0" i="0">
+                <a:solidFill>
+                  <a:srgbClr val="FFFFFF"/>
+                </a:solidFill>
+                <a:latin typeface="IBM Plex Sans Regular" charset="0"/>
+                <a:cs typeface="IBM Plex Sans Regular" charset="0"/>
+              </a:defRPr>
+            </a:lvl1pPr>
+          </a:lstStyle>
+          <a:p>
+            <a:fld id="{E4DBDE34-E9B5-E04F-B662-69720E4BCB53}" type="slidenum">
+              <a:rPr lang="en-US" smtClean="0"/>
+              <a:pPr/>
+              <a:t>‹#›</a:t>
+            </a:fld>
+            <a:endParaRPr lang="en-US" dirty="0"/>
+          </a:p>
+        </p:txBody>
+      </p:sp>
+    </p:spTree>
+    <p:extLst>
+      <p:ext uri="{BB962C8B-B14F-4D97-AF65-F5344CB8AC3E}">
+        <p14:creationId xmlns:p14="http://schemas.microsoft.com/office/powerpoint/2010/main" val="3318598456"/>
+      </p:ext>
+    </p:extLst>
+  </p:cSld>
+  <p:clrMap bg1="lt1" tx1="dk1" bg2="lt2" tx2="dk2" accent1="accent1" accent2="accent2" accent3="accent3" accent4="accent4" accent5="accent5" accent6="accent6" hlink="hlink" folHlink="folHlink"/>
+  <p:sldLayoutIdLst>
+    <p:sldLayoutId id="2147483789" r:id="rId1"/>
+  </p:sldLayoutIdLst>
+  <p:hf hdr="0" dt="0"/>
+  <p:txStyles>
+    <p:titleStyle>
+      <a:lvl1pPr algn="l" defTabSz="457200" rtl="0" eaLnBrk="1" latinLnBrk="0" hangingPunct="1">
+        <a:lnSpc>
+          <a:spcPct val="100000"/>
+        </a:lnSpc>
+        <a:spcBef>
+          <a:spcPct val="0"/>
+        </a:spcBef>
+        <a:buNone/>
+        <a:defRPr sz="2000" b="0" i="0" kern="1200">
+          <a:solidFill>
+            <a:srgbClr val="FFFFFF"/>
+          </a:solidFill>
+          <a:latin typeface="IBM Plex Sans Regular" charset="0"/>
+          <a:ea typeface="+mj-ea"/>
+          <a:cs typeface="IBM Plex Sans Regular" charset="0"/>
+        </a:defRPr>
+      </a:lvl1pPr>
+    </p:titleStyle>
+    <p:bodyStyle>
+      <a:lvl1pPr marL="0" indent="0" algn="l" defTabSz="457200" rtl="0" eaLnBrk="1" latinLnBrk="0" hangingPunct="1">
+        <a:spcBef>
+          <a:spcPts val="1500"/>
+        </a:spcBef>
+        <a:buFont typeface="Arial"/>
+        <a:buNone/>
+        <a:defRPr sz="2000" b="0" i="0" kern="1200">
+          <a:solidFill>
+            <a:srgbClr val="FFFFFF"/>
+          </a:solidFill>
+          <a:latin typeface="IBM Plex Sans Regular" charset="0"/>
+          <a:ea typeface="+mn-ea"/>
+          <a:cs typeface="IBM Plex Sans Regular" charset="0"/>
+        </a:defRPr>
+      </a:lvl1pPr>
+      <a:lvl2pPr marL="173038" indent="-173038" algn="l" defTabSz="457200" rtl="0" eaLnBrk="1" latinLnBrk="0" hangingPunct="1">
+        <a:spcBef>
+          <a:spcPct val="20000"/>
+        </a:spcBef>
+        <a:buFont typeface="Arial"/>
+        <a:buChar char="–"/>
+        <a:defRPr sz="2000" b="0" i="0" kern="1200">
+          <a:solidFill>
+            <a:srgbClr val="FFFFFF"/>
+          </a:solidFill>
+          <a:latin typeface="IBM Plex Sans Regular" charset="0"/>
+          <a:ea typeface="+mn-ea"/>
+          <a:cs typeface="IBM Plex Sans Regular" charset="0"/>
+        </a:defRPr>
+      </a:lvl2pPr>
+      <a:lvl3pPr marL="396875" indent="-173038" algn="l" defTabSz="457200" rtl="0" eaLnBrk="1" latinLnBrk="0" hangingPunct="1">
+        <a:spcBef>
+          <a:spcPct val="20000"/>
+        </a:spcBef>
+        <a:buFont typeface="Arial"/>
+        <a:buChar char="•"/>
+        <a:defRPr sz="2000" b="0" i="0" kern="1200">
+          <a:solidFill>
+            <a:srgbClr val="FFFFFF"/>
+          </a:solidFill>
+          <a:latin typeface="IBM Plex Sans Regular" charset="0"/>
+          <a:ea typeface="+mn-ea"/>
+          <a:cs typeface="IBM Plex Sans Regular" charset="0"/>
+        </a:defRPr>
+      </a:lvl3pPr>
+      <a:lvl4pPr marL="625475" indent="-168275" algn="l" defTabSz="457200" rtl="0" eaLnBrk="1" latinLnBrk="0" hangingPunct="1">
+        <a:spcBef>
+          <a:spcPct val="20000"/>
+        </a:spcBef>
+        <a:buFont typeface="Arial"/>
+        <a:buChar char="–"/>
+        <a:defRPr sz="2000" b="0" i="0" kern="1200">
+          <a:solidFill>
+            <a:srgbClr val="FFFFFF"/>
+          </a:solidFill>
+          <a:latin typeface="IBM Plex Sans Regular" charset="0"/>
+          <a:ea typeface="+mn-ea"/>
+          <a:cs typeface="IBM Plex Sans Regular" charset="0"/>
+        </a:defRPr>
+      </a:lvl4pPr>
+      <a:lvl5pPr marL="803275" indent="-173038" algn="l" defTabSz="457200" rtl="0" eaLnBrk="1" latinLnBrk="0" hangingPunct="1">
+        <a:spcBef>
+          <a:spcPct val="20000"/>
+        </a:spcBef>
+        <a:buFont typeface="Arial"/>
+        <a:buChar char="»"/>
+        <a:defRPr sz="2000" b="0" i="0" kern="1200">
+          <a:solidFill>
+            <a:srgbClr val="FFFFFF"/>
+          </a:solidFill>
+          <a:latin typeface="IBM Plex Sans Regular" charset="0"/>
+          <a:ea typeface="+mn-ea"/>
+          <a:cs typeface="IBM Plex Sans Regular" charset="0"/>
+        </a:defRPr>
+      </a:lvl5pPr>
+      <a:lvl6pPr marL="2514600" indent="-228600" algn="l" defTabSz="457200" rtl="0" eaLnBrk="1" latinLnBrk="0" hangingPunct="1">
+        <a:spcBef>
+          <a:spcPct val="20000"/>
+        </a:spcBef>
+        <a:buFont typeface="Arial"/>
+        <a:buChar char="•"/>
+        <a:defRPr sz="2000" kern="1200">
+          <a:solidFill>
+            <a:schemeClr val="tx1"/>
+          </a:solidFill>
+          <a:latin typeface="+mn-lt"/>
+          <a:ea typeface="+mn-ea"/>
+          <a:cs typeface="+mn-cs"/>
+        </a:defRPr>
+      </a:lvl6pPr>
+      <a:lvl7pPr marL="2971800" indent="-228600" algn="l" defTabSz="457200" rtl="0" eaLnBrk="1" latinLnBrk="0" hangingPunct="1">
+        <a:spcBef>
+          <a:spcPct val="20000"/>
+        </a:spcBef>
+        <a:buFont typeface="Arial"/>
+        <a:buChar char="•"/>
+        <a:defRPr sz="2000" kern="1200">
+          <a:solidFill>
+            <a:schemeClr val="tx1"/>
+          </a:solidFill>
+          <a:latin typeface="+mn-lt"/>
+          <a:ea typeface="+mn-ea"/>
+          <a:cs typeface="+mn-cs"/>
+        </a:defRPr>
+      </a:lvl7pPr>
+      <a:lvl8pPr marL="3429000" indent="-228600" algn="l" defTabSz="457200" rtl="0" eaLnBrk="1" latinLnBrk="0" hangingPunct="1">
+        <a:spcBef>
+          <a:spcPct val="20000"/>
+        </a:spcBef>
+        <a:buFont typeface="Arial"/>
+        <a:buChar char="•"/>
+        <a:defRPr sz="2000" kern="1200">
+          <a:solidFill>
+            <a:schemeClr val="tx1"/>
+          </a:solidFill>
+          <a:latin typeface="+mn-lt"/>
+          <a:ea typeface="+mn-ea"/>
+          <a:cs typeface="+mn-cs"/>
+        </a:defRPr>
+      </a:lvl8pPr>
+      <a:lvl9pPr marL="3886200" indent="-228600" algn="l" defTabSz="457200" rtl="0" eaLnBrk="1" latinLnBrk="0" hangingPunct="1">
+        <a:spcBef>
+          <a:spcPct val="20000"/>
+        </a:spcBef>
+        <a:buFont typeface="Arial"/>
+        <a:buChar char="•"/>
+        <a:defRPr sz="2000" kern="1200">
+          <a:solidFill>
+            <a:schemeClr val="tx1"/>
+          </a:solidFill>
+          <a:latin typeface="+mn-lt"/>
+          <a:ea typeface="+mn-ea"/>
+          <a:cs typeface="+mn-cs"/>
+        </a:defRPr>
+      </a:lvl9pPr>
+    </p:bodyStyle>
+    <p:otherStyle>
+      <a:defPPr>
+        <a:defRPr lang="en-US"/>
+      </a:defPPr>
+      <a:lvl1pPr marL="0" algn="l" defTabSz="457200" rtl="0" eaLnBrk="1" latinLnBrk="0" hangingPunct="1">
+        <a:defRPr sz="1800" kern="1200">
+          <a:solidFill>
+            <a:schemeClr val="tx1"/>
+          </a:solidFill>
+          <a:latin typeface="+mn-lt"/>
+          <a:ea typeface="+mn-ea"/>
+          <a:cs typeface="+mn-cs"/>
+        </a:defRPr>
+      </a:lvl1pPr>
+      <a:lvl2pPr marL="457200" algn="l" defTabSz="457200" rtl="0" eaLnBrk="1" latinLnBrk="0" hangingPunct="1">
+        <a:defRPr sz="1800" kern="1200">
+          <a:solidFill>
+            <a:schemeClr val="tx1"/>
+          </a:solidFill>
+          <a:latin typeface="+mn-lt"/>
+          <a:ea typeface="+mn-ea"/>
+          <a:cs typeface="+mn-cs"/>
+        </a:defRPr>
+      </a:lvl2pPr>
+      <a:lvl3pPr marL="914400" algn="l" defTabSz="457200" rtl="0" eaLnBrk="1" latinLnBrk="0" hangingPunct="1">
+        <a:defRPr sz="1800" kern="1200">
+          <a:solidFill>
+            <a:schemeClr val="tx1"/>
+          </a:solidFill>
+          <a:latin typeface="+mn-lt"/>
+          <a:ea typeface="+mn-ea"/>
+          <a:cs typeface="+mn-cs"/>
+        </a:defRPr>
+      </a:lvl3pPr>
+      <a:lvl4pPr marL="1371600" algn="l" defTabSz="457200" rtl="0" eaLnBrk="1" latinLnBrk="0" hangingPunct="1">
+        <a:defRPr sz="1800" kern="1200">
+          <a:solidFill>
+            <a:schemeClr val="tx1"/>
+          </a:solidFill>
+          <a:latin typeface="+mn-lt"/>
+          <a:ea typeface="+mn-ea"/>
+          <a:cs typeface="+mn-cs"/>
+        </a:defRPr>
+      </a:lvl4pPr>
+      <a:lvl5pPr marL="1828800" algn="l" defTabSz="457200" rtl="0" eaLnBrk="1" latinLnBrk="0" hangingPunct="1">
+        <a:defRPr sz="1800" kern="1200">
+          <a:solidFill>
+            <a:schemeClr val="tx1"/>
+          </a:solidFill>
+          <a:latin typeface="+mn-lt"/>
+          <a:ea typeface="+mn-ea"/>
+          <a:cs typeface="+mn-cs"/>
+        </a:defRPr>
+      </a:lvl5pPr>
+      <a:lvl6pPr marL="2286000" algn="l" defTabSz="457200" rtl="0" eaLnBrk="1" latinLnBrk="0" hangingPunct="1">
+        <a:defRPr sz="1800" kern="1200">
+          <a:solidFill>
+            <a:schemeClr val="tx1"/>
+          </a:solidFill>
+          <a:latin typeface="+mn-lt"/>
+          <a:ea typeface="+mn-ea"/>
+          <a:cs typeface="+mn-cs"/>
+        </a:defRPr>
+      </a:lvl6pPr>
+      <a:lvl7pPr marL="2743200" algn="l" defTabSz="457200" rtl="0" eaLnBrk="1" latinLnBrk="0" hangingPunct="1">
+        <a:defRPr sz="1800" kern="1200">
+          <a:solidFill>
+            <a:schemeClr val="tx1"/>
+          </a:solidFill>
+          <a:latin typeface="+mn-lt"/>
+          <a:ea typeface="+mn-ea"/>
+          <a:cs typeface="+mn-cs"/>
+        </a:defRPr>
+      </a:lvl7pPr>
+      <a:lvl8pPr marL="3200400" algn="l" defTabSz="457200" rtl="0" eaLnBrk="1" latinLnBrk="0" hangingPunct="1">
+        <a:defRPr sz="1800" kern="1200">
+          <a:solidFill>
+            <a:schemeClr val="tx1"/>
+          </a:solidFill>
+          <a:latin typeface="+mn-lt"/>
+          <a:ea typeface="+mn-ea"/>
+          <a:cs typeface="+mn-cs"/>
+        </a:defRPr>
+      </a:lvl8pPr>
+      <a:lvl9pPr marL="3657600" algn="l" defTabSz="457200" rtl="0" eaLnBrk="1" latinLnBrk="0" hangingPunct="1">
+        <a:defRPr sz="1800" kern="1200">
+          <a:solidFill>
+            <a:schemeClr val="tx1"/>
+          </a:solidFill>
+          <a:latin typeface="+mn-lt"/>
+          <a:ea typeface="+mn-ea"/>
+          <a:cs typeface="+mn-cs"/>
+        </a:defRPr>
+      </a:lvl9pPr>
+    </p:otherStyle>
+  </p:txStyles>
+</p:sldMaster>
+</file>
+
+<file path=ppt/slides/slide1.xml><?xml version="1.0" encoding="utf-8"?>
+<p:sld xmlns:a="http://schemas.openxmlformats.org/drawingml/2006/main" xmlns:r="http://schemas.openxmlformats.org/officeDocument/2006/relationships" xmlns:p="http://schemas.openxmlformats.org/presentationml/2006/main">
+  <p:cSld>
+    <p:bg>
+      <p:bgPr>
+        <a:solidFill>
+          <a:schemeClr val="tx2"/>
+        </a:solidFill>
+        <a:effectLst/>
+      </p:bgPr>
+    </p:bg>
+    <p:spTree>
+      <p:nvGrpSpPr>
+        <p:cNvPr id="1" name=""/>
+        <p:cNvGrpSpPr/>
+        <p:nvPr/>
+      </p:nvGrpSpPr>
+      <p:grpSpPr>
+        <a:xfrm>
+          <a:off x="0" y="0"/>
+          <a:ext cx="0" cy="0"/>
+          <a:chOff x="0" y="0"/>
+          <a:chExt cx="0" cy="0"/>
+        </a:xfrm>
+      </p:grpSpPr>
+      <p:pic>
+        <p:nvPicPr>
+          <p:cNvPr id="10" name="Picture 9">
+            <a:extLst>
+              <a:ext uri="{FF2B5EF4-FFF2-40B4-BE49-F238E27FC236}">
+                <a16:creationId xmlns:a16="http://schemas.microsoft.com/office/drawing/2014/main" id="{132F28D3-CDC8-9B47-B90A-4D6A64EAE482}"/>
+              </a:ext>
+            </a:extLst>
+          </p:cNvPr>
+          <p:cNvPicPr>
+            <a:picLocks noChangeAspect="1"/>
+          </p:cNvPicPr>
+          <p:nvPr/>
+        </p:nvPicPr>
+        <p:blipFill>
+          <a:blip r:embed="rId3" cstate="screen">
+            <a:extLst>
+              <a:ext uri="{28A0092B-C50C-407E-A947-70E740481C1C}">
+                <a14:useLocalDpi xmlns:a14="http://schemas.microsoft.com/office/drawing/2010/main"/>
+              </a:ext>
+            </a:extLst>
+          </a:blip>
+          <a:stretch>
+            <a:fillRect/>
+          </a:stretch>
+        </p:blipFill>
+        <p:spPr>
+          <a:xfrm>
+            <a:off x="-234817" y="-103123"/>
+            <a:ext cx="4218039" cy="1467314"/>
+          </a:xfrm>
+          <a:prstGeom prst="rect">
+            <a:avLst/>
+          </a:prstGeom>
+        </p:spPr>
+      </p:pic>
+      <p:pic>
+        <p:nvPicPr>
+          <p:cNvPr id="11" name="Picture 10">
+            <a:extLst>
+              <a:ext uri="{FF2B5EF4-FFF2-40B4-BE49-F238E27FC236}">
+                <a16:creationId xmlns:a16="http://schemas.microsoft.com/office/drawing/2014/main" id="{6EE98EE6-EFCE-094C-B89F-C401C31F1E31}"/>
+              </a:ext>
+            </a:extLst>
+          </p:cNvPr>
+          <p:cNvPicPr>
+            <a:picLocks noChangeAspect="1"/>
+          </p:cNvPicPr>
+          <p:nvPr/>
+        </p:nvPicPr>
+        <p:blipFill>
+          <a:blip r:embed="rId4" cstate="screen">
+            <a:extLst>
+              <a:ext uri="{28A0092B-C50C-407E-A947-70E740481C1C}">
+                <a14:useLocalDpi xmlns:a14="http://schemas.microsoft.com/office/drawing/2010/main"/>
+              </a:ext>
+            </a:extLst>
+          </a:blip>
+          <a:stretch>
+            <a:fillRect/>
+          </a:stretch>
+        </p:blipFill>
+        <p:spPr>
+          <a:xfrm>
+            <a:off x="3983222" y="1252913"/>
+            <a:ext cx="4681456" cy="4106970"/>
+          </a:xfrm>
+          <a:prstGeom prst="rect">
+            <a:avLst/>
+          </a:prstGeom>
+        </p:spPr>
+      </p:pic>
+      <p:sp>
+        <p:nvSpPr>
+          <p:cNvPr id="2" name="Rectangle 1">
+            <a:extLst>
+              <a:ext uri="{FF2B5EF4-FFF2-40B4-BE49-F238E27FC236}">
+                <a16:creationId xmlns:a16="http://schemas.microsoft.com/office/drawing/2014/main" id="{D81D943D-ACED-FB47-A159-9C4704EF0090}"/>
+              </a:ext>
+            </a:extLst>
+          </p:cNvPr>
+          <p:cNvSpPr/>
+          <p:nvPr/>
+        </p:nvSpPr>
+        <p:spPr>
+          <a:xfrm>
+            <a:off x="160317" y="2829344"/>
+            <a:ext cx="3662588" cy="1384995"/>
+          </a:xfrm>
+          <a:prstGeom prst="rect">
+            <a:avLst/>
+          </a:prstGeom>
+        </p:spPr>
+        <p:txBody>
+          <a:bodyPr wrap="square">
+            <a:spAutoFit/>
+          </a:bodyPr>
+          <a:lstStyle/>
+          <a:p>
+            <a:pPr marL="0" marR="0" lvl="0" indent="0" algn="l" defTabSz="457200" rtl="0" eaLnBrk="1" fontAlgn="auto" latinLnBrk="0" hangingPunct="1">
+              <a:lnSpc>
+                <a:spcPct val="100000"/>
+              </a:lnSpc>
+              <a:spcBef>
+                <a:spcPts val="0"/>
+              </a:spcBef>
+              <a:spcAft>
+                <a:spcPts val="0"/>
+              </a:spcAft>
+              <a:buClrTx/>
+              <a:buSzTx/>
+              <a:buFontTx/>
+              <a:buNone/>
+              <a:tabLst/>
+              <a:defRPr/>
+            </a:pPr>
+            <a:r>
+              <a:rPr kumimoji="0" lang="en-US" sz="2800" b="1" i="0" u="none" strike="noStrike" kern="1200" cap="none" spc="0" normalizeH="0" baseline="0" noProof="0" dirty="0">
+                <a:ln>
+                  <a:noFill/>
+                </a:ln>
+                <a:solidFill>
+                  <a:srgbClr val="A7FAE6">
+                    <a:lumMod val="10000"/>
+                    <a:lumOff val="90000"/>
+                  </a:srgbClr>
+                </a:solidFill>
+                <a:effectLst/>
+                <a:uLnTx/>
+                <a:uFillTx/>
+                <a:latin typeface="Arial"/>
+                <a:ea typeface="ＭＳ Ｐゴシック" charset="0"/>
+                <a:cs typeface="+mn-cs"/>
+              </a:rPr>
+              <a:t>Introduction</a:t>
+            </a:r>
+          </a:p>
+          <a:p>
+            <a:pPr marL="0" marR="0" lvl="0" indent="0" algn="l" defTabSz="457200" rtl="0" eaLnBrk="1" fontAlgn="auto" latinLnBrk="0" hangingPunct="1">
+              <a:lnSpc>
+                <a:spcPct val="100000"/>
+              </a:lnSpc>
+              <a:spcBef>
+                <a:spcPts val="0"/>
+              </a:spcBef>
+              <a:spcAft>
+                <a:spcPts val="0"/>
+              </a:spcAft>
+              <a:buClrTx/>
+              <a:buSzTx/>
+              <a:buFontTx/>
+              <a:buNone/>
+              <a:tabLst/>
+              <a:defRPr/>
+            </a:pPr>
+            <a:endParaRPr lang="en-US" sz="2800" b="1" dirty="0">
+              <a:solidFill>
+                <a:srgbClr val="A7FAE6">
+                  <a:lumMod val="10000"/>
+                  <a:lumOff val="90000"/>
+                </a:srgbClr>
+              </a:solidFill>
+              <a:latin typeface="Arial"/>
+            </a:endParaRPr>
+          </a:p>
+          <a:p>
+            <a:pPr marL="0" marR="0" lvl="0" indent="0" algn="l" defTabSz="457200" rtl="0" eaLnBrk="1" fontAlgn="auto" latinLnBrk="0" hangingPunct="1">
+              <a:lnSpc>
+                <a:spcPct val="100000"/>
+              </a:lnSpc>
+              <a:spcBef>
+                <a:spcPts val="0"/>
+              </a:spcBef>
+              <a:spcAft>
+                <a:spcPts val="0"/>
+              </a:spcAft>
+              <a:buClrTx/>
+              <a:buSzTx/>
+              <a:buFontTx/>
+              <a:buNone/>
+              <a:tabLst/>
+              <a:defRPr/>
+            </a:pPr>
+            <a:r>
+              <a:rPr lang="en-US" sz="2800" b="1" dirty="0">
+                <a:solidFill>
+                  <a:srgbClr val="A7FAE6">
+                    <a:lumMod val="10000"/>
+                    <a:lumOff val="90000"/>
+                  </a:srgbClr>
+                </a:solidFill>
+                <a:latin typeface="Arial"/>
+              </a:rPr>
+              <a:t>Agenda</a:t>
+            </a:r>
+            <a:endParaRPr kumimoji="0" lang="en-US" sz="2800" b="1" i="0" u="none" strike="noStrike" kern="1200" cap="none" spc="0" normalizeH="0" baseline="0" noProof="0" dirty="0">
+              <a:ln>
+                <a:noFill/>
+              </a:ln>
+              <a:solidFill>
+                <a:srgbClr val="A7FAE6">
+                  <a:lumMod val="10000"/>
+                  <a:lumOff val="90000"/>
+                </a:srgbClr>
+              </a:solidFill>
+              <a:effectLst/>
+              <a:uLnTx/>
+              <a:uFillTx/>
+              <a:latin typeface="Arial"/>
+              <a:ea typeface="ＭＳ Ｐゴシック" charset="0"/>
+              <a:cs typeface="+mn-cs"/>
+            </a:endParaRPr>
+          </a:p>
+        </p:txBody>
+      </p:sp>
+      <p:sp>
+        <p:nvSpPr>
+          <p:cNvPr id="6" name="Footer Placeholder 5">
+            <a:extLst>
+              <a:ext uri="{FF2B5EF4-FFF2-40B4-BE49-F238E27FC236}">
+                <a16:creationId xmlns:a16="http://schemas.microsoft.com/office/drawing/2014/main" id="{C763D48A-7780-9543-8F15-43349A872E80}"/>
+              </a:ext>
+            </a:extLst>
+          </p:cNvPr>
+          <p:cNvSpPr>
+            <a:spLocks noGrp="1"/>
+          </p:cNvSpPr>
+          <p:nvPr>
+            <p:ph type="ftr" sz="quarter" idx="3"/>
           </p:nvPr>
         </p:nvSpPr>
         <p:spPr/>
@@ -3110,23 +2989,59 @@
           <a:bodyPr/>
           <a:lstStyle/>
           <a:p>
-            <a:r>
-              <a:rPr lang="en-US" i="1" dirty="0"/>
-              <a:t>Section 0</a:t>
-            </a:r>
-          </a:p>
-          <a:p>
-            <a:r>
-              <a:rPr lang="en-US" dirty="0"/>
-              <a:t>Agenda</a:t>
-            </a:r>
+            <a:pPr marL="0" marR="0" lvl="0" indent="0" algn="l" defTabSz="457200" rtl="0" eaLnBrk="1" fontAlgn="auto" latinLnBrk="0" hangingPunct="1">
+              <a:lnSpc>
+                <a:spcPct val="100000"/>
+              </a:lnSpc>
+              <a:spcBef>
+                <a:spcPts val="0"/>
+              </a:spcBef>
+              <a:spcAft>
+                <a:spcPts val="0"/>
+              </a:spcAft>
+              <a:buClrTx/>
+              <a:buSzTx/>
+              <a:buFontTx/>
+              <a:buNone/>
+              <a:tabLst/>
+              <a:defRPr/>
+            </a:pPr>
+            <a:r>
+              <a:rPr kumimoji="0" lang="de-DE" sz="600" b="0" i="0" u="none" strike="noStrike" kern="1200" cap="none" spc="0" normalizeH="0" baseline="0" noProof="0" dirty="0">
+                <a:ln>
+                  <a:noFill/>
+                </a:ln>
+                <a:solidFill>
+                  <a:srgbClr val="C0E6FF"/>
+                </a:solidFill>
+                <a:effectLst/>
+                <a:uLnTx/>
+                <a:uFillTx/>
+                <a:latin typeface="Arial"/>
+                <a:cs typeface="Arial" charset="0"/>
+              </a:rPr>
+              <a:t>IBM Watson IoT / © 2019 IBM Corporation</a:t>
+            </a:r>
+            <a:endParaRPr kumimoji="0" lang="en-US" sz="600" b="0" i="0" u="none" strike="noStrike" kern="1200" cap="none" spc="0" normalizeH="0" baseline="0" noProof="0" dirty="0">
+              <a:ln>
+                <a:noFill/>
+              </a:ln>
+              <a:solidFill>
+                <a:srgbClr val="C0E6FF"/>
+              </a:solidFill>
+              <a:effectLst/>
+              <a:uLnTx/>
+              <a:uFillTx/>
+              <a:latin typeface="Arial"/>
+              <a:cs typeface="Arial" charset="0"/>
+            </a:endParaRPr>
           </a:p>
         </p:txBody>
       </p:sp>
     </p:spTree>
     <p:extLst>
       <p:ext uri="{BB962C8B-B14F-4D97-AF65-F5344CB8AC3E}">
-        <p14:creationId xmlns:p14="http://schemas.microsoft.com/office/powerpoint/2010/main" val="3168118551"/>
+        <p14:creationId xmlns:p14="http://schemas.microsoft.com/office/powerpoint/2010/main" val="2955395290"/>
       </p:ext>
     </p:extLst>
   </p:cSld>
@@ -3155,29 +3070,6 @@
       </p:grpSpPr>
       <p:sp>
         <p:nvSpPr>
-          <p:cNvPr id="2" name="Title 1"/>
-          <p:cNvSpPr>
-            <a:spLocks noGrp="1"/>
-          </p:cNvSpPr>
-          <p:nvPr>
-            <p:ph type="title"/>
-          </p:nvPr>
-        </p:nvSpPr>
-        <p:spPr/>
-        <p:txBody>
-          <a:bodyPr/>
-          <a:lstStyle/>
-          <a:p>
-            <a:r>
-              <a:rPr lang="en-US"/>
-              <a:t>Agenda</a:t>
-            </a:r>
-            <a:endParaRPr lang="en-US" dirty="0"/>
-          </a:p>
-        </p:txBody>
-      </p:sp>
-      <p:sp>
-        <p:nvSpPr>
           <p:cNvPr id="3" name="Content Placeholder 2"/>
           <p:cNvSpPr>
             <a:spLocks noGrp="1"/>
@@ -3186,7 +3078,11 @@
             <p:ph idx="1"/>
           </p:nvPr>
         </p:nvSpPr>
-        <p:spPr/>
+        <p:spPr>
+          <a:prstGeom prst="rect">
+            <a:avLst/>
+          </a:prstGeom>
+        </p:spPr>
         <p:txBody>
           <a:bodyPr/>
           <a:lstStyle/>
@@ -3200,7 +3096,7 @@
             <a:pPr lvl="1"/>
             <a:r>
               <a:rPr lang="en-US" dirty="0"/>
-              <a:t>Give an overview of Watson IoT on IBM Cloud</a:t>
+              <a:t>Get started using Watson IoT Platform on IBM Cloud</a:t>
             </a:r>
           </a:p>
           <a:p>
@@ -3223,11 +3119,7 @@
             <a:pPr lvl="2"/>
             <a:r>
               <a:rPr lang="en-US" dirty="0"/>
-              <a:t>Lab 1: Getting Started</a:t>
-            </a:r>
-            <a:r>
-              <a:rPr lang="en-US"/>
-              <a:t>, Connectivity</a:t>
+              <a:t>Lab 1: Getting Started, Connectivity</a:t>
             </a:r>
           </a:p>
           <a:p>
@@ -3245,7 +3137,7 @@
             <a:pPr lvl="2"/>
             <a:r>
               <a:rPr lang="en-US" dirty="0"/>
-              <a:t>Lab 2: Data visualization</a:t>
+              <a:t>Lab 2: IoT Data operational dashboarding and visualization </a:t>
             </a:r>
           </a:p>
           <a:p>
@@ -3322,6 +3214,34 @@
               <a:t>2</a:t>
             </a:fld>
             <a:endParaRPr lang="en-US"/>
+          </a:p>
+        </p:txBody>
+      </p:sp>
+      <p:sp>
+        <p:nvSpPr>
+          <p:cNvPr id="8" name="Title 7">
+            <a:extLst>
+              <a:ext uri="{FF2B5EF4-FFF2-40B4-BE49-F238E27FC236}">
+                <a16:creationId xmlns:a16="http://schemas.microsoft.com/office/drawing/2014/main" id="{901AE13F-A334-4419-B7E6-44AAE058B815}"/>
+              </a:ext>
+            </a:extLst>
+          </p:cNvPr>
+          <p:cNvSpPr>
+            <a:spLocks noGrp="1"/>
+          </p:cNvSpPr>
+          <p:nvPr>
+            <p:ph type="title"/>
+          </p:nvPr>
+        </p:nvSpPr>
+        <p:spPr/>
+        <p:txBody>
+          <a:bodyPr/>
+          <a:lstStyle/>
+          <a:p>
+            <a:r>
+              <a:rPr lang="en-US" dirty="0"/>
+              <a:t>Agenda</a:t>
+            </a:r>
           </a:p>
         </p:txBody>
       </p:sp>
@@ -3388,7 +3308,7 @@
 </file>
 
 <file path=ppt/slides/slide3.xml><?xml version="1.0" encoding="utf-8"?>
-<p:sld xmlns:a="http://schemas.openxmlformats.org/drawingml/2006/main" xmlns:r="http://schemas.openxmlformats.org/officeDocument/2006/relationships" xmlns:p="http://schemas.openxmlformats.org/presentationml/2006/main">
+<p:sld xmlns:a="http://schemas.openxmlformats.org/drawingml/2006/main" xmlns:r="http://schemas.openxmlformats.org/officeDocument/2006/relationships" xmlns:p="http://schemas.openxmlformats.org/presentationml/2006/main" show="0">
   <p:cSld>
     <p:spTree>
       <p:nvGrpSpPr>
@@ -3420,7 +3340,12 @@
             <p:ph type="title"/>
           </p:nvPr>
         </p:nvSpPr>
-        <p:spPr/>
+        <p:spPr>
+          <a:xfrm>
+            <a:off x="1" y="0"/>
+            <a:ext cx="6775372" cy="649995"/>
+          </a:xfrm>
+        </p:spPr>
         <p:txBody>
           <a:bodyPr/>
           <a:lstStyle/>
@@ -3448,7 +3373,11 @@
             <p:ph idx="1"/>
           </p:nvPr>
         </p:nvSpPr>
-        <p:spPr/>
+        <p:spPr>
+          <a:prstGeom prst="rect">
+            <a:avLst/>
+          </a:prstGeom>
+        </p:spPr>
         <p:txBody>
           <a:bodyPr/>
           <a:lstStyle/>
@@ -3619,7 +3548,7 @@
 </file>
 
 <file path=ppt/slides/slide4.xml><?xml version="1.0" encoding="utf-8"?>
-<p:sld xmlns:a="http://schemas.openxmlformats.org/drawingml/2006/main" xmlns:r="http://schemas.openxmlformats.org/officeDocument/2006/relationships" xmlns:p="http://schemas.openxmlformats.org/presentationml/2006/main">
+<p:sld xmlns:a="http://schemas.openxmlformats.org/drawingml/2006/main" xmlns:r="http://schemas.openxmlformats.org/officeDocument/2006/relationships" xmlns:p="http://schemas.openxmlformats.org/presentationml/2006/main" show="0">
   <p:cSld>
     <p:spTree>
       <p:nvGrpSpPr>
@@ -3635,34 +3564,6 @@
           <a:chExt cx="0" cy="0"/>
         </a:xfrm>
       </p:grpSpPr>
-      <p:sp>
-        <p:nvSpPr>
-          <p:cNvPr id="2" name="Title 1">
-            <a:extLst>
-              <a:ext uri="{FF2B5EF4-FFF2-40B4-BE49-F238E27FC236}">
-                <a16:creationId xmlns:a16="http://schemas.microsoft.com/office/drawing/2014/main" id="{3B439E13-EBC8-4477-A31E-DCFF6A6F339C}"/>
-              </a:ext>
-            </a:extLst>
-          </p:cNvPr>
-          <p:cNvSpPr>
-            <a:spLocks noGrp="1"/>
-          </p:cNvSpPr>
-          <p:nvPr>
-            <p:ph type="title"/>
-          </p:nvPr>
-        </p:nvSpPr>
-        <p:spPr/>
-        <p:txBody>
-          <a:bodyPr/>
-          <a:lstStyle/>
-          <a:p>
-            <a:r>
-              <a:rPr lang="en-US" dirty="0"/>
-              <a:t>Logistics</a:t>
-            </a:r>
-          </a:p>
-        </p:txBody>
-      </p:sp>
       <p:sp>
         <p:nvSpPr>
           <p:cNvPr id="3" name="Content Placeholder 2">
@@ -3718,6 +3619,34 @@
               <a:t>4</a:t>
             </a:fld>
             <a:endParaRPr lang="en-US"/>
+          </a:p>
+        </p:txBody>
+      </p:sp>
+      <p:sp>
+        <p:nvSpPr>
+          <p:cNvPr id="2" name="Title 1">
+            <a:extLst>
+              <a:ext uri="{FF2B5EF4-FFF2-40B4-BE49-F238E27FC236}">
+                <a16:creationId xmlns:a16="http://schemas.microsoft.com/office/drawing/2014/main" id="{3B439E13-EBC8-4477-A31E-DCFF6A6F339C}"/>
+              </a:ext>
+            </a:extLst>
+          </p:cNvPr>
+          <p:cNvSpPr>
+            <a:spLocks noGrp="1"/>
+          </p:cNvSpPr>
+          <p:nvPr>
+            <p:ph type="title"/>
+          </p:nvPr>
+        </p:nvSpPr>
+        <p:spPr/>
+        <p:txBody>
+          <a:bodyPr/>
+          <a:lstStyle/>
+          <a:p>
+            <a:r>
+              <a:rPr lang="en-US" dirty="0"/>
+              <a:t>Logistics</a:t>
+            </a:r>
           </a:p>
         </p:txBody>
       </p:sp>
@@ -4058,6 +3987,327 @@
 </file>
 
 <file path=ppt/theme/theme2.xml><?xml version="1.0" encoding="utf-8"?>
+<a:theme xmlns:a="http://schemas.openxmlformats.org/drawingml/2006/main" name="Watson: Group 1, Blue 70">
+  <a:themeElements>
+    <a:clrScheme name="Group 1, Blue 70">
+      <a:dk1>
+        <a:srgbClr val="C0E6FF"/>
+      </a:dk1>
+      <a:lt1>
+        <a:srgbClr val="A7FAE6"/>
+      </a:lt1>
+      <a:dk2>
+        <a:srgbClr val="152935"/>
+      </a:dk2>
+      <a:lt2>
+        <a:srgbClr val="264A60"/>
+      </a:lt2>
+      <a:accent1>
+        <a:srgbClr val="5596E6"/>
+      </a:accent1>
+      <a:accent2>
+        <a:srgbClr val="5AAAFA"/>
+      </a:accent2>
+      <a:accent3>
+        <a:srgbClr val="7CC7FF"/>
+      </a:accent3>
+      <a:accent4>
+        <a:srgbClr val="00B4A0"/>
+      </a:accent4>
+      <a:accent5>
+        <a:srgbClr val="41D6C3"/>
+      </a:accent5>
+      <a:accent6>
+        <a:srgbClr val="6EEDD8"/>
+      </a:accent6>
+      <a:hlink>
+        <a:srgbClr val="AEAEAE"/>
+      </a:hlink>
+      <a:folHlink>
+        <a:srgbClr val="E0E0E0"/>
+      </a:folHlink>
+    </a:clrScheme>
+    <a:fontScheme name="Office Classic 2">
+      <a:majorFont>
+        <a:latin typeface="Arial"/>
+        <a:ea typeface=""/>
+        <a:cs typeface=""/>
+        <a:font script="Jpan" typeface="ＭＳ Ｐゴシック"/>
+        <a:font script="Hang" typeface="굴림"/>
+        <a:font script="Hans" typeface="黑体"/>
+        <a:font script="Hant" typeface="微軟正黑體"/>
+        <a:font script="Arab" typeface="Arial"/>
+        <a:font script="Hebr" typeface="Arial"/>
+        <a:font script="Thai" typeface="Cordia New"/>
+        <a:font script="Ethi" typeface="Nyala"/>
+        <a:font script="Beng" typeface="Vrinda"/>
+        <a:font script="Gujr" typeface="Shruti"/>
+        <a:font script="Khmr" typeface="DaunPenh"/>
+        <a:font script="Knda" typeface="Tunga"/>
+        <a:font script="Guru" typeface="Raavi"/>
+        <a:font script="Cans" typeface="Euphemia"/>
+        <a:font script="Cher" typeface="Plantagenet Cherokee"/>
+        <a:font script="Yiii" typeface="Microsoft Yi Baiti"/>
+        <a:font script="Tibt" typeface="Microsoft Himalaya"/>
+        <a:font script="Thaa" typeface="MV Boli"/>
+        <a:font script="Deva" typeface="Mangal"/>
+        <a:font script="Telu" typeface="Gautami"/>
+        <a:font script="Taml" typeface="Latha"/>
+        <a:font script="Syrc" typeface="Estrangelo Edessa"/>
+        <a:font script="Orya" typeface="Kalinga"/>
+        <a:font script="Mlym" typeface="Kartika"/>
+        <a:font script="Laoo" typeface="DokChampa"/>
+        <a:font script="Sinh" typeface="Iskoola Pota"/>
+        <a:font script="Mong" typeface="Mongolian Baiti"/>
+        <a:font script="Viet" typeface="Arial"/>
+        <a:font script="Uigh" typeface="Microsoft Uighur"/>
+      </a:majorFont>
+      <a:minorFont>
+        <a:latin typeface="Arial"/>
+        <a:ea typeface=""/>
+        <a:cs typeface=""/>
+        <a:font script="Jpan" typeface="ＭＳ Ｐゴシック"/>
+        <a:font script="Hang" typeface="굴림"/>
+        <a:font script="Hans" typeface="黑体"/>
+        <a:font script="Hant" typeface="微軟正黑體"/>
+        <a:font script="Arab" typeface="Arial"/>
+        <a:font script="Hebr" typeface="Arial"/>
+        <a:font script="Thai" typeface="Cordia New"/>
+        <a:font script="Ethi" typeface="Nyala"/>
+        <a:font script="Beng" typeface="Vrinda"/>
+        <a:font script="Gujr" typeface="Shruti"/>
+        <a:font script="Khmr" typeface="DaunPenh"/>
+        <a:font script="Knda" typeface="Tunga"/>
+        <a:font script="Guru" typeface="Raavi"/>
+        <a:font script="Cans" typeface="Euphemia"/>
+        <a:font script="Cher" typeface="Plantagenet Cherokee"/>
+        <a:font script="Yiii" typeface="Microsoft Yi Baiti"/>
+        <a:font script="Tibt" typeface="Microsoft Himalaya"/>
+        <a:font script="Thaa" typeface="MV Boli"/>
+        <a:font script="Deva" typeface="Mangal"/>
+        <a:font script="Telu" typeface="Gautami"/>
+        <a:font script="Taml" typeface="Latha"/>
+        <a:font script="Syrc" typeface="Estrangelo Edessa"/>
+        <a:font script="Orya" typeface="Kalinga"/>
+        <a:font script="Mlym" typeface="Kartika"/>
+        <a:font script="Laoo" typeface="DokChampa"/>
+        <a:font script="Sinh" typeface="Iskoola Pota"/>
+        <a:font script="Mong" typeface="Mongolian Baiti"/>
+        <a:font script="Viet" typeface="Arial"/>
+        <a:font script="Uigh" typeface="Microsoft Uighur"/>
+      </a:minorFont>
+    </a:fontScheme>
+    <a:fmtScheme name="Office">
+      <a:fillStyleLst>
+        <a:solidFill>
+          <a:schemeClr val="phClr"/>
+        </a:solidFill>
+        <a:gradFill rotWithShape="1">
+          <a:gsLst>
+            <a:gs pos="0">
+              <a:schemeClr val="phClr">
+                <a:tint val="50000"/>
+                <a:satMod val="300000"/>
+              </a:schemeClr>
+            </a:gs>
+            <a:gs pos="35000">
+              <a:schemeClr val="phClr">
+                <a:tint val="37000"/>
+                <a:satMod val="300000"/>
+              </a:schemeClr>
+            </a:gs>
+            <a:gs pos="100000">
+              <a:schemeClr val="phClr">
+                <a:tint val="15000"/>
+                <a:satMod val="350000"/>
+              </a:schemeClr>
+            </a:gs>
+          </a:gsLst>
+          <a:lin ang="16200000" scaled="1"/>
+        </a:gradFill>
+        <a:gradFill rotWithShape="1">
+          <a:gsLst>
+            <a:gs pos="0">
+              <a:schemeClr val="phClr">
+                <a:tint val="100000"/>
+                <a:shade val="100000"/>
+                <a:satMod val="130000"/>
+              </a:schemeClr>
+            </a:gs>
+            <a:gs pos="100000">
+              <a:schemeClr val="phClr">
+                <a:tint val="50000"/>
+                <a:shade val="100000"/>
+                <a:satMod val="350000"/>
+              </a:schemeClr>
+            </a:gs>
+          </a:gsLst>
+          <a:lin ang="16200000" scaled="0"/>
+        </a:gradFill>
+      </a:fillStyleLst>
+      <a:lnStyleLst>
+        <a:ln w="9525" cap="flat" cmpd="sng" algn="ctr">
+          <a:solidFill>
+            <a:schemeClr val="phClr">
+              <a:shade val="95000"/>
+              <a:satMod val="105000"/>
+            </a:schemeClr>
+          </a:solidFill>
+          <a:prstDash val="solid"/>
+        </a:ln>
+        <a:ln w="25400" cap="flat" cmpd="sng" algn="ctr">
+          <a:solidFill>
+            <a:schemeClr val="phClr"/>
+          </a:solidFill>
+          <a:prstDash val="solid"/>
+        </a:ln>
+        <a:ln w="38100" cap="flat" cmpd="sng" algn="ctr">
+          <a:solidFill>
+            <a:schemeClr val="phClr"/>
+          </a:solidFill>
+          <a:prstDash val="solid"/>
+        </a:ln>
+      </a:lnStyleLst>
+      <a:effectStyleLst>
+        <a:effectStyle>
+          <a:effectLst>
+            <a:outerShdw blurRad="40000" dist="20000" dir="5400000" rotWithShape="0">
+              <a:srgbClr val="000000">
+                <a:alpha val="38000"/>
+              </a:srgbClr>
+            </a:outerShdw>
+          </a:effectLst>
+        </a:effectStyle>
+        <a:effectStyle>
+          <a:effectLst>
+            <a:outerShdw blurRad="40000" dist="23000" dir="5400000" rotWithShape="0">
+              <a:srgbClr val="000000">
+                <a:alpha val="35000"/>
+              </a:srgbClr>
+            </a:outerShdw>
+          </a:effectLst>
+        </a:effectStyle>
+        <a:effectStyle>
+          <a:effectLst>
+            <a:outerShdw blurRad="40000" dist="23000" dir="5400000" rotWithShape="0">
+              <a:srgbClr val="000000">
+                <a:alpha val="35000"/>
+              </a:srgbClr>
+            </a:outerShdw>
+          </a:effectLst>
+          <a:scene3d>
+            <a:camera prst="orthographicFront">
+              <a:rot lat="0" lon="0" rev="0"/>
+            </a:camera>
+            <a:lightRig rig="threePt" dir="t">
+              <a:rot lat="0" lon="0" rev="1200000"/>
+            </a:lightRig>
+          </a:scene3d>
+          <a:sp3d>
+            <a:bevelT w="63500" h="25400"/>
+          </a:sp3d>
+        </a:effectStyle>
+      </a:effectStyleLst>
+      <a:bgFillStyleLst>
+        <a:solidFill>
+          <a:schemeClr val="phClr"/>
+        </a:solidFill>
+        <a:gradFill rotWithShape="1">
+          <a:gsLst>
+            <a:gs pos="0">
+              <a:schemeClr val="phClr">
+                <a:tint val="40000"/>
+                <a:satMod val="350000"/>
+              </a:schemeClr>
+            </a:gs>
+            <a:gs pos="40000">
+              <a:schemeClr val="phClr">
+                <a:tint val="45000"/>
+                <a:shade val="99000"/>
+                <a:satMod val="350000"/>
+              </a:schemeClr>
+            </a:gs>
+            <a:gs pos="100000">
+              <a:schemeClr val="phClr">
+                <a:shade val="20000"/>
+                <a:satMod val="255000"/>
+              </a:schemeClr>
+            </a:gs>
+          </a:gsLst>
+          <a:path path="circle">
+            <a:fillToRect l="50000" t="-80000" r="50000" b="180000"/>
+          </a:path>
+        </a:gradFill>
+        <a:gradFill rotWithShape="1">
+          <a:gsLst>
+            <a:gs pos="0">
+              <a:schemeClr val="phClr">
+                <a:tint val="80000"/>
+                <a:satMod val="300000"/>
+              </a:schemeClr>
+            </a:gs>
+            <a:gs pos="100000">
+              <a:schemeClr val="phClr">
+                <a:shade val="30000"/>
+                <a:satMod val="200000"/>
+              </a:schemeClr>
+            </a:gs>
+          </a:gsLst>
+          <a:path path="circle">
+            <a:fillToRect l="50000" t="50000" r="50000" b="50000"/>
+          </a:path>
+        </a:gradFill>
+      </a:bgFillStyleLst>
+    </a:fmtScheme>
+  </a:themeElements>
+  <a:objectDefaults>
+    <a:spDef>
+      <a:spPr/>
+      <a:bodyPr wrap="square" lIns="0" tIns="0" rIns="0" bIns="0">
+        <a:noAutofit/>
+      </a:bodyPr>
+      <a:lstStyle>
+        <a:defPPr>
+          <a:defRPr sz="1200" dirty="0" err="1">
+            <a:solidFill>
+              <a:srgbClr val="FFFFFF"/>
+            </a:solidFill>
+            <a:latin typeface="Arial"/>
+            <a:cs typeface="Arial"/>
+          </a:defRPr>
+        </a:defPPr>
+      </a:lstStyle>
+    </a:spDef>
+    <a:lnDef>
+      <a:spPr/>
+      <a:bodyPr/>
+      <a:lstStyle/>
+      <a:style>
+        <a:lnRef idx="2">
+          <a:schemeClr val="accent1"/>
+        </a:lnRef>
+        <a:fillRef idx="0">
+          <a:schemeClr val="accent1"/>
+        </a:fillRef>
+        <a:effectRef idx="1">
+          <a:schemeClr val="accent1"/>
+        </a:effectRef>
+        <a:fontRef idx="minor">
+          <a:schemeClr val="tx1"/>
+        </a:fontRef>
+      </a:style>
+    </a:lnDef>
+  </a:objectDefaults>
+  <a:extraClrSchemeLst/>
+  <a:extLst>
+    <a:ext uri="{05A4C25C-085E-4340-85A3-A5531E510DB2}">
+      <thm15:themeFamily xmlns:thm15="http://schemas.microsoft.com/office/thememl/2012/main" name="Presentation4" id="{33BFB818-7A0E-2E46-A523-CC5792A9E3B9}" vid="{4CC7CD83-69BC-F045-84B6-F94E145C6B8A}"/>
+    </a:ext>
+  </a:extLst>
+</a:theme>
+</file>
+
+<file path=ppt/theme/theme3.xml><?xml version="1.0" encoding="utf-8"?>
 <a:theme xmlns:a="http://schemas.openxmlformats.org/drawingml/2006/main" name="Office Theme">
   <a:themeElements>
     <a:clrScheme name="">
@@ -4342,7 +4592,7 @@
 </a:theme>
 </file>
 
-<file path=ppt/theme/theme3.xml><?xml version="1.0" encoding="utf-8"?>
+<file path=ppt/theme/theme4.xml><?xml version="1.0" encoding="utf-8"?>
 <a:theme xmlns:a="http://schemas.openxmlformats.org/drawingml/2006/main" name="Office Theme">
   <a:themeElements>
     <a:clrScheme name="Office">

</xml_diff>